<commit_message>
Final form of presentation
Final form of presentation - presented on 15.01.2020
</commit_message>
<xml_diff>
--- a/Checkers_Unity_LeapMotion.pptx
+++ b/Checkers_Unity_LeapMotion.pptx
@@ -5,7 +5,7 @@
     <p:sldMasterId id="2147483648" r:id="rId1"/>
   </p:sldMasterIdLst>
   <p:notesMasterIdLst>
-    <p:notesMasterId r:id="rId16"/>
+    <p:notesMasterId r:id="rId17"/>
   </p:notesMasterIdLst>
   <p:sldIdLst>
     <p:sldId id="256" r:id="rId2"/>
@@ -22,6 +22,7 @@
     <p:sldId id="272" r:id="rId13"/>
     <p:sldId id="268" r:id="rId14"/>
     <p:sldId id="278" r:id="rId15"/>
+    <p:sldId id="280" r:id="rId16"/>
   </p:sldIdLst>
   <p:sldSz cx="9144000" cy="6858000" type="screen4x3"/>
   <p:notesSz cx="6858000" cy="9144000"/>
@@ -120,6 +121,22 @@
       </a:defRPr>
     </a:lvl9pPr>
   </p:defaultTextStyle>
+  <p:extLst>
+    <p:ext uri="{EFAFB233-063F-42B5-8137-9DF3F51BA10A}">
+      <p15:sldGuideLst xmlns:p15="http://schemas.microsoft.com/office/powerpoint/2012/main">
+        <p15:guide id="1" orient="horz" pos="2160">
+          <p15:clr>
+            <a:srgbClr val="A4A3A4"/>
+          </p15:clr>
+        </p15:guide>
+        <p15:guide id="2" pos="2880">
+          <p15:clr>
+            <a:srgbClr val="A4A3A4"/>
+          </p15:clr>
+        </p15:guide>
+      </p15:sldGuideLst>
+    </p:ext>
+  </p:extLst>
 </p:presentation>
 </file>
 
@@ -205,7 +222,7 @@
           <a:p>
             <a:fld id="{2DBF3C08-1B80-4FD8-B50C-6B3E7BC0D888}" type="datetimeFigureOut">
               <a:rPr lang="ro-RO" smtClean="0"/>
-              <a:t>14.01.2020</a:t>
+              <a:t>15.01.2020</a:t>
             </a:fld>
             <a:endParaRPr lang="ro-RO"/>
           </a:p>
@@ -269,35 +286,35 @@
           <a:p>
             <a:pPr lvl="0"/>
             <a:r>
-              <a:rPr lang="en-US" smtClean="0"/>
+              <a:rPr lang="en-US"/>
               <a:t>Click to edit Master text styles</a:t>
             </a:r>
           </a:p>
           <a:p>
             <a:pPr lvl="1"/>
             <a:r>
-              <a:rPr lang="en-US" smtClean="0"/>
+              <a:rPr lang="en-US"/>
               <a:t>Second level</a:t>
             </a:r>
           </a:p>
           <a:p>
             <a:pPr lvl="2"/>
             <a:r>
-              <a:rPr lang="en-US" smtClean="0"/>
+              <a:rPr lang="en-US"/>
               <a:t>Third level</a:t>
             </a:r>
           </a:p>
           <a:p>
             <a:pPr lvl="3"/>
             <a:r>
-              <a:rPr lang="en-US" smtClean="0"/>
+              <a:rPr lang="en-US"/>
               <a:t>Fourth level</a:t>
             </a:r>
           </a:p>
           <a:p>
             <a:pPr lvl="4"/>
             <a:r>
-              <a:rPr lang="en-US" smtClean="0"/>
+              <a:rPr lang="en-US"/>
               <a:t>Fifth level</a:t>
             </a:r>
             <a:endParaRPr lang="ro-RO"/>
@@ -601,7 +618,7 @@
           <a:bodyPr/>
           <a:lstStyle/>
           <a:p>
-            <a:endParaRPr lang="en-US" dirty="0" smtClean="0"/>
+            <a:endParaRPr lang="en-US" dirty="0"/>
           </a:p>
         </p:txBody>
       </p:sp>
@@ -769,7 +786,7 @@
           <a:bodyPr/>
           <a:lstStyle/>
           <a:p>
-            <a:endParaRPr lang="en-US" baseline="0" dirty="0" smtClean="0"/>
+            <a:endParaRPr lang="en-US" baseline="0" dirty="0"/>
           </a:p>
         </p:txBody>
       </p:sp>
@@ -853,7 +870,7 @@
           <a:bodyPr/>
           <a:lstStyle/>
           <a:p>
-            <a:endParaRPr lang="en-US" baseline="0" dirty="0" smtClean="0"/>
+            <a:endParaRPr lang="en-US" baseline="0" dirty="0"/>
           </a:p>
         </p:txBody>
       </p:sp>
@@ -1273,7 +1290,7 @@
           <a:bodyPr/>
           <a:lstStyle/>
           <a:p>
-            <a:endParaRPr lang="en-US" dirty="0" smtClean="0"/>
+            <a:endParaRPr lang="en-US" dirty="0"/>
           </a:p>
         </p:txBody>
       </p:sp>
@@ -1357,7 +1374,7 @@
           <a:bodyPr/>
           <a:lstStyle/>
           <a:p>
-            <a:endParaRPr lang="en-US" dirty="0" smtClean="0"/>
+            <a:endParaRPr lang="en-US" dirty="0"/>
           </a:p>
         </p:txBody>
       </p:sp>
@@ -1441,7 +1458,7 @@
           <a:bodyPr/>
           <a:lstStyle/>
           <a:p>
-            <a:endParaRPr lang="en-US" dirty="0" smtClean="0"/>
+            <a:endParaRPr lang="en-US" dirty="0"/>
           </a:p>
         </p:txBody>
       </p:sp>
@@ -1525,7 +1542,7 @@
           <a:bodyPr/>
           <a:lstStyle/>
           <a:p>
-            <a:endParaRPr lang="en-US" dirty="0" smtClean="0"/>
+            <a:endParaRPr lang="en-US" dirty="0"/>
           </a:p>
         </p:txBody>
       </p:sp>
@@ -1610,10 +1627,9 @@
           </a:lstStyle>
           <a:p>
             <a:r>
-              <a:rPr lang="en-US" dirty="0" smtClean="0"/>
+              <a:rPr lang="en-US" dirty="0"/>
               <a:t>Click to edit Master title style</a:t>
             </a:r>
-            <a:endParaRPr lang="en-US" dirty="0"/>
           </a:p>
         </p:txBody>
       </p:sp>
@@ -1729,10 +1745,9 @@
           </a:lstStyle>
           <a:p>
             <a:r>
-              <a:rPr lang="en-US" smtClean="0"/>
+              <a:rPr lang="en-US"/>
               <a:t>Click to edit Master subtitle style</a:t>
             </a:r>
-            <a:endParaRPr lang="en-US"/>
           </a:p>
         </p:txBody>
       </p:sp>
@@ -1762,7 +1777,7 @@
             <a:fld id="{1D8BD707-D9CF-40AE-B4C6-C98DA3205C09}" type="datetimeFigureOut">
               <a:rPr lang="en-US" smtClean="0"/>
               <a:pPr/>
-              <a:t>1/14/2020</a:t>
+              <a:t>1/15/2020</a:t>
             </a:fld>
             <a:endParaRPr lang="en-US"/>
           </a:p>
@@ -1860,10 +1875,9 @@
           <a:lstStyle/>
           <a:p>
             <a:r>
-              <a:rPr lang="en-US" smtClean="0"/>
+              <a:rPr lang="en-US"/>
               <a:t>Click to edit Master title style</a:t>
             </a:r>
-            <a:endParaRPr lang="en-US"/>
           </a:p>
         </p:txBody>
       </p:sp>
@@ -1884,38 +1898,37 @@
           <a:p>
             <a:pPr lvl="0"/>
             <a:r>
-              <a:rPr lang="en-US" smtClean="0"/>
+              <a:rPr lang="en-US"/>
               <a:t>Click to edit Master text styles</a:t>
             </a:r>
           </a:p>
           <a:p>
             <a:pPr lvl="1"/>
             <a:r>
-              <a:rPr lang="en-US" smtClean="0"/>
+              <a:rPr lang="en-US"/>
               <a:t>Second level</a:t>
             </a:r>
           </a:p>
           <a:p>
             <a:pPr lvl="2"/>
             <a:r>
-              <a:rPr lang="en-US" smtClean="0"/>
+              <a:rPr lang="en-US"/>
               <a:t>Third level</a:t>
             </a:r>
           </a:p>
           <a:p>
             <a:pPr lvl="3"/>
             <a:r>
-              <a:rPr lang="en-US" smtClean="0"/>
+              <a:rPr lang="en-US"/>
               <a:t>Fourth level</a:t>
             </a:r>
           </a:p>
           <a:p>
             <a:pPr lvl="4"/>
             <a:r>
-              <a:rPr lang="en-US" smtClean="0"/>
+              <a:rPr lang="en-US"/>
               <a:t>Fifth level</a:t>
             </a:r>
-            <a:endParaRPr lang="en-US"/>
           </a:p>
         </p:txBody>
       </p:sp>
@@ -1945,7 +1958,7 @@
             <a:fld id="{1D8BD707-D9CF-40AE-B4C6-C98DA3205C09}" type="datetimeFigureOut">
               <a:rPr lang="en-US" smtClean="0"/>
               <a:pPr/>
-              <a:t>1/14/2020</a:t>
+              <a:t>1/15/2020</a:t>
             </a:fld>
             <a:endParaRPr lang="en-US"/>
           </a:p>
@@ -2048,10 +2061,9 @@
           <a:lstStyle/>
           <a:p>
             <a:r>
-              <a:rPr lang="en-US" smtClean="0"/>
+              <a:rPr lang="en-US"/>
               <a:t>Click to edit Master title style</a:t>
             </a:r>
-            <a:endParaRPr lang="en-US"/>
           </a:p>
         </p:txBody>
       </p:sp>
@@ -2077,38 +2089,37 @@
           <a:p>
             <a:pPr lvl="0"/>
             <a:r>
-              <a:rPr lang="en-US" smtClean="0"/>
+              <a:rPr lang="en-US"/>
               <a:t>Click to edit Master text styles</a:t>
             </a:r>
           </a:p>
           <a:p>
             <a:pPr lvl="1"/>
             <a:r>
-              <a:rPr lang="en-US" smtClean="0"/>
+              <a:rPr lang="en-US"/>
               <a:t>Second level</a:t>
             </a:r>
           </a:p>
           <a:p>
             <a:pPr lvl="2"/>
             <a:r>
-              <a:rPr lang="en-US" smtClean="0"/>
+              <a:rPr lang="en-US"/>
               <a:t>Third level</a:t>
             </a:r>
           </a:p>
           <a:p>
             <a:pPr lvl="3"/>
             <a:r>
-              <a:rPr lang="en-US" smtClean="0"/>
+              <a:rPr lang="en-US"/>
               <a:t>Fourth level</a:t>
             </a:r>
           </a:p>
           <a:p>
             <a:pPr lvl="4"/>
             <a:r>
-              <a:rPr lang="en-US" smtClean="0"/>
+              <a:rPr lang="en-US"/>
               <a:t>Fifth level</a:t>
             </a:r>
-            <a:endParaRPr lang="en-US"/>
           </a:p>
         </p:txBody>
       </p:sp>
@@ -2138,7 +2149,7 @@
             <a:fld id="{1D8BD707-D9CF-40AE-B4C6-C98DA3205C09}" type="datetimeFigureOut">
               <a:rPr lang="en-US" smtClean="0"/>
               <a:pPr/>
-              <a:t>1/14/2020</a:t>
+              <a:t>1/15/2020</a:t>
             </a:fld>
             <a:endParaRPr lang="en-US"/>
           </a:p>
@@ -2236,10 +2247,9 @@
           <a:lstStyle/>
           <a:p>
             <a:r>
-              <a:rPr lang="en-US" dirty="0" smtClean="0"/>
+              <a:rPr lang="en-US" dirty="0"/>
               <a:t>Click to edit Master title style</a:t>
             </a:r>
-            <a:endParaRPr lang="en-US" dirty="0"/>
           </a:p>
         </p:txBody>
       </p:sp>
@@ -2260,38 +2270,37 @@
           <a:p>
             <a:pPr lvl="0"/>
             <a:r>
-              <a:rPr lang="en-US" dirty="0" smtClean="0"/>
+              <a:rPr lang="en-US" dirty="0"/>
               <a:t>Click to edit Master text styles</a:t>
             </a:r>
           </a:p>
           <a:p>
             <a:pPr lvl="1"/>
             <a:r>
-              <a:rPr lang="en-US" dirty="0" smtClean="0"/>
+              <a:rPr lang="en-US" dirty="0"/>
               <a:t>Second level</a:t>
             </a:r>
           </a:p>
           <a:p>
             <a:pPr lvl="2"/>
             <a:r>
-              <a:rPr lang="en-US" dirty="0" smtClean="0"/>
+              <a:rPr lang="en-US" dirty="0"/>
               <a:t>Third level</a:t>
             </a:r>
           </a:p>
           <a:p>
             <a:pPr lvl="3"/>
             <a:r>
-              <a:rPr lang="en-US" dirty="0" smtClean="0"/>
+              <a:rPr lang="en-US" dirty="0"/>
               <a:t>Fourth level</a:t>
             </a:r>
           </a:p>
           <a:p>
             <a:pPr lvl="4"/>
             <a:r>
-              <a:rPr lang="en-US" dirty="0" smtClean="0"/>
+              <a:rPr lang="en-US" dirty="0"/>
               <a:t>Fifth level</a:t>
             </a:r>
-            <a:endParaRPr lang="en-US" dirty="0"/>
           </a:p>
         </p:txBody>
       </p:sp>
@@ -2321,7 +2330,7 @@
             <a:fld id="{1D8BD707-D9CF-40AE-B4C6-C98DA3205C09}" type="datetimeFigureOut">
               <a:rPr lang="en-US" smtClean="0"/>
               <a:pPr/>
-              <a:t>1/14/2020</a:t>
+              <a:t>1/15/2020</a:t>
             </a:fld>
             <a:endParaRPr lang="en-US"/>
           </a:p>
@@ -2428,10 +2437,9 @@
           </a:lstStyle>
           <a:p>
             <a:r>
-              <a:rPr lang="en-US" dirty="0" smtClean="0"/>
+              <a:rPr lang="en-US" dirty="0"/>
               <a:t>Click to edit Master title style</a:t>
             </a:r>
-            <a:endParaRPr lang="en-US" dirty="0"/>
           </a:p>
         </p:txBody>
       </p:sp>
@@ -2548,7 +2556,7 @@
           <a:p>
             <a:pPr lvl="0"/>
             <a:r>
-              <a:rPr lang="en-US" dirty="0" smtClean="0"/>
+              <a:rPr lang="en-US" dirty="0"/>
               <a:t>Click to edit Master text styles</a:t>
             </a:r>
           </a:p>
@@ -2580,7 +2588,7 @@
             <a:fld id="{1D8BD707-D9CF-40AE-B4C6-C98DA3205C09}" type="datetimeFigureOut">
               <a:rPr lang="en-US" smtClean="0"/>
               <a:pPr/>
-              <a:t>1/14/2020</a:t>
+              <a:t>1/15/2020</a:t>
             </a:fld>
             <a:endParaRPr lang="en-US"/>
           </a:p>
@@ -2678,10 +2686,9 @@
           <a:lstStyle/>
           <a:p>
             <a:r>
-              <a:rPr lang="en-US" smtClean="0"/>
+              <a:rPr lang="en-US"/>
               <a:t>Click to edit Master title style</a:t>
             </a:r>
-            <a:endParaRPr lang="en-US"/>
           </a:p>
         </p:txBody>
       </p:sp>
@@ -2735,38 +2742,37 @@
           <a:p>
             <a:pPr lvl="0"/>
             <a:r>
-              <a:rPr lang="en-US" smtClean="0"/>
+              <a:rPr lang="en-US"/>
               <a:t>Click to edit Master text styles</a:t>
             </a:r>
           </a:p>
           <a:p>
             <a:pPr lvl="1"/>
             <a:r>
-              <a:rPr lang="en-US" smtClean="0"/>
+              <a:rPr lang="en-US"/>
               <a:t>Second level</a:t>
             </a:r>
           </a:p>
           <a:p>
             <a:pPr lvl="2"/>
             <a:r>
-              <a:rPr lang="en-US" smtClean="0"/>
+              <a:rPr lang="en-US"/>
               <a:t>Third level</a:t>
             </a:r>
           </a:p>
           <a:p>
             <a:pPr lvl="3"/>
             <a:r>
-              <a:rPr lang="en-US" smtClean="0"/>
+              <a:rPr lang="en-US"/>
               <a:t>Fourth level</a:t>
             </a:r>
           </a:p>
           <a:p>
             <a:pPr lvl="4"/>
             <a:r>
-              <a:rPr lang="en-US" smtClean="0"/>
+              <a:rPr lang="en-US"/>
               <a:t>Fifth level</a:t>
             </a:r>
-            <a:endParaRPr lang="en-US"/>
           </a:p>
         </p:txBody>
       </p:sp>
@@ -2820,38 +2826,37 @@
           <a:p>
             <a:pPr lvl="0"/>
             <a:r>
-              <a:rPr lang="en-US" smtClean="0"/>
+              <a:rPr lang="en-US"/>
               <a:t>Click to edit Master text styles</a:t>
             </a:r>
           </a:p>
           <a:p>
             <a:pPr lvl="1"/>
             <a:r>
-              <a:rPr lang="en-US" smtClean="0"/>
+              <a:rPr lang="en-US"/>
               <a:t>Second level</a:t>
             </a:r>
           </a:p>
           <a:p>
             <a:pPr lvl="2"/>
             <a:r>
-              <a:rPr lang="en-US" smtClean="0"/>
+              <a:rPr lang="en-US"/>
               <a:t>Third level</a:t>
             </a:r>
           </a:p>
           <a:p>
             <a:pPr lvl="3"/>
             <a:r>
-              <a:rPr lang="en-US" smtClean="0"/>
+              <a:rPr lang="en-US"/>
               <a:t>Fourth level</a:t>
             </a:r>
           </a:p>
           <a:p>
             <a:pPr lvl="4"/>
             <a:r>
-              <a:rPr lang="en-US" smtClean="0"/>
+              <a:rPr lang="en-US"/>
               <a:t>Fifth level</a:t>
             </a:r>
-            <a:endParaRPr lang="en-US"/>
           </a:p>
         </p:txBody>
       </p:sp>
@@ -2881,7 +2886,7 @@
             <a:fld id="{1D8BD707-D9CF-40AE-B4C6-C98DA3205C09}" type="datetimeFigureOut">
               <a:rPr lang="en-US" smtClean="0"/>
               <a:pPr/>
-              <a:t>1/14/2020</a:t>
+              <a:t>1/15/2020</a:t>
             </a:fld>
             <a:endParaRPr lang="en-US"/>
           </a:p>
@@ -2983,10 +2988,9 @@
           </a:lstStyle>
           <a:p>
             <a:r>
-              <a:rPr lang="en-US" smtClean="0"/>
+              <a:rPr lang="en-US"/>
               <a:t>Click to edit Master title style</a:t>
             </a:r>
-            <a:endParaRPr lang="en-US"/>
           </a:p>
         </p:txBody>
       </p:sp>
@@ -3049,7 +3053,7 @@
           <a:p>
             <a:pPr lvl="0"/>
             <a:r>
-              <a:rPr lang="en-US" smtClean="0"/>
+              <a:rPr lang="en-US"/>
               <a:t>Click to edit Master text styles</a:t>
             </a:r>
           </a:p>
@@ -3105,38 +3109,37 @@
           <a:p>
             <a:pPr lvl="0"/>
             <a:r>
-              <a:rPr lang="en-US" smtClean="0"/>
+              <a:rPr lang="en-US"/>
               <a:t>Click to edit Master text styles</a:t>
             </a:r>
           </a:p>
           <a:p>
             <a:pPr lvl="1"/>
             <a:r>
-              <a:rPr lang="en-US" smtClean="0"/>
+              <a:rPr lang="en-US"/>
               <a:t>Second level</a:t>
             </a:r>
           </a:p>
           <a:p>
             <a:pPr lvl="2"/>
             <a:r>
-              <a:rPr lang="en-US" smtClean="0"/>
+              <a:rPr lang="en-US"/>
               <a:t>Third level</a:t>
             </a:r>
           </a:p>
           <a:p>
             <a:pPr lvl="3"/>
             <a:r>
-              <a:rPr lang="en-US" smtClean="0"/>
+              <a:rPr lang="en-US"/>
               <a:t>Fourth level</a:t>
             </a:r>
           </a:p>
           <a:p>
             <a:pPr lvl="4"/>
             <a:r>
-              <a:rPr lang="en-US" smtClean="0"/>
+              <a:rPr lang="en-US"/>
               <a:t>Fifth level</a:t>
             </a:r>
-            <a:endParaRPr lang="en-US"/>
           </a:p>
         </p:txBody>
       </p:sp>
@@ -3199,7 +3202,7 @@
           <a:p>
             <a:pPr lvl="0"/>
             <a:r>
-              <a:rPr lang="en-US" smtClean="0"/>
+              <a:rPr lang="en-US"/>
               <a:t>Click to edit Master text styles</a:t>
             </a:r>
           </a:p>
@@ -3255,38 +3258,37 @@
           <a:p>
             <a:pPr lvl="0"/>
             <a:r>
-              <a:rPr lang="en-US" smtClean="0"/>
+              <a:rPr lang="en-US"/>
               <a:t>Click to edit Master text styles</a:t>
             </a:r>
           </a:p>
           <a:p>
             <a:pPr lvl="1"/>
             <a:r>
-              <a:rPr lang="en-US" smtClean="0"/>
+              <a:rPr lang="en-US"/>
               <a:t>Second level</a:t>
             </a:r>
           </a:p>
           <a:p>
             <a:pPr lvl="2"/>
             <a:r>
-              <a:rPr lang="en-US" smtClean="0"/>
+              <a:rPr lang="en-US"/>
               <a:t>Third level</a:t>
             </a:r>
           </a:p>
           <a:p>
             <a:pPr lvl="3"/>
             <a:r>
-              <a:rPr lang="en-US" smtClean="0"/>
+              <a:rPr lang="en-US"/>
               <a:t>Fourth level</a:t>
             </a:r>
           </a:p>
           <a:p>
             <a:pPr lvl="4"/>
             <a:r>
-              <a:rPr lang="en-US" smtClean="0"/>
+              <a:rPr lang="en-US"/>
               <a:t>Fifth level</a:t>
             </a:r>
-            <a:endParaRPr lang="en-US"/>
           </a:p>
         </p:txBody>
       </p:sp>
@@ -3316,7 +3318,7 @@
             <a:fld id="{1D8BD707-D9CF-40AE-B4C6-C98DA3205C09}" type="datetimeFigureOut">
               <a:rPr lang="en-US" smtClean="0"/>
               <a:pPr/>
-              <a:t>1/14/2020</a:t>
+              <a:t>1/15/2020</a:t>
             </a:fld>
             <a:endParaRPr lang="en-US"/>
           </a:p>
@@ -3414,10 +3416,9 @@
           <a:lstStyle/>
           <a:p>
             <a:r>
-              <a:rPr lang="en-US" smtClean="0"/>
+              <a:rPr lang="en-US"/>
               <a:t>Click to edit Master title style</a:t>
             </a:r>
-            <a:endParaRPr lang="en-US"/>
           </a:p>
         </p:txBody>
       </p:sp>
@@ -3447,7 +3448,7 @@
             <a:fld id="{1D8BD707-D9CF-40AE-B4C6-C98DA3205C09}" type="datetimeFigureOut">
               <a:rPr lang="en-US" smtClean="0"/>
               <a:pPr/>
-              <a:t>1/14/2020</a:t>
+              <a:t>1/15/2020</a:t>
             </a:fld>
             <a:endParaRPr lang="en-US"/>
           </a:p>
@@ -3555,7 +3556,7 @@
             <a:fld id="{1D8BD707-D9CF-40AE-B4C6-C98DA3205C09}" type="datetimeFigureOut">
               <a:rPr lang="en-US" smtClean="0"/>
               <a:pPr/>
-              <a:t>1/14/2020</a:t>
+              <a:t>1/15/2020</a:t>
             </a:fld>
             <a:endParaRPr lang="en-US"/>
           </a:p>
@@ -3662,10 +3663,9 @@
           </a:lstStyle>
           <a:p>
             <a:r>
-              <a:rPr lang="en-US" smtClean="0"/>
+              <a:rPr lang="en-US"/>
               <a:t>Click to edit Master title style</a:t>
             </a:r>
-            <a:endParaRPr lang="en-US"/>
           </a:p>
         </p:txBody>
       </p:sp>
@@ -3719,38 +3719,37 @@
           <a:p>
             <a:pPr lvl="0"/>
             <a:r>
-              <a:rPr lang="en-US" smtClean="0"/>
+              <a:rPr lang="en-US"/>
               <a:t>Click to edit Master text styles</a:t>
             </a:r>
           </a:p>
           <a:p>
             <a:pPr lvl="1"/>
             <a:r>
-              <a:rPr lang="en-US" smtClean="0"/>
+              <a:rPr lang="en-US"/>
               <a:t>Second level</a:t>
             </a:r>
           </a:p>
           <a:p>
             <a:pPr lvl="2"/>
             <a:r>
-              <a:rPr lang="en-US" smtClean="0"/>
+              <a:rPr lang="en-US"/>
               <a:t>Third level</a:t>
             </a:r>
           </a:p>
           <a:p>
             <a:pPr lvl="3"/>
             <a:r>
-              <a:rPr lang="en-US" smtClean="0"/>
+              <a:rPr lang="en-US"/>
               <a:t>Fourth level</a:t>
             </a:r>
           </a:p>
           <a:p>
             <a:pPr lvl="4"/>
             <a:r>
-              <a:rPr lang="en-US" smtClean="0"/>
+              <a:rPr lang="en-US"/>
               <a:t>Fifth level</a:t>
             </a:r>
-            <a:endParaRPr lang="en-US"/>
           </a:p>
         </p:txBody>
       </p:sp>
@@ -3813,7 +3812,7 @@
           <a:p>
             <a:pPr lvl="0"/>
             <a:r>
-              <a:rPr lang="en-US" smtClean="0"/>
+              <a:rPr lang="en-US"/>
               <a:t>Click to edit Master text styles</a:t>
             </a:r>
           </a:p>
@@ -3845,7 +3844,7 @@
             <a:fld id="{1D8BD707-D9CF-40AE-B4C6-C98DA3205C09}" type="datetimeFigureOut">
               <a:rPr lang="en-US" smtClean="0"/>
               <a:pPr/>
-              <a:t>1/14/2020</a:t>
+              <a:t>1/15/2020</a:t>
             </a:fld>
             <a:endParaRPr lang="en-US"/>
           </a:p>
@@ -3952,10 +3951,9 @@
           </a:lstStyle>
           <a:p>
             <a:r>
-              <a:rPr lang="en-US" smtClean="0"/>
+              <a:rPr lang="en-US"/>
               <a:t>Click to edit Master title style</a:t>
             </a:r>
-            <a:endParaRPr lang="en-US"/>
           </a:p>
         </p:txBody>
       </p:sp>
@@ -4079,7 +4077,7 @@
           <a:p>
             <a:pPr lvl="0"/>
             <a:r>
-              <a:rPr lang="en-US" smtClean="0"/>
+              <a:rPr lang="en-US"/>
               <a:t>Click to edit Master text styles</a:t>
             </a:r>
           </a:p>
@@ -4111,7 +4109,7 @@
             <a:fld id="{1D8BD707-D9CF-40AE-B4C6-C98DA3205C09}" type="datetimeFigureOut">
               <a:rPr lang="en-US" smtClean="0"/>
               <a:pPr/>
-              <a:t>1/14/2020</a:t>
+              <a:t>1/15/2020</a:t>
             </a:fld>
             <a:endParaRPr lang="en-US"/>
           </a:p>
@@ -4252,10 +4250,9 @@
           <a:lstStyle/>
           <a:p>
             <a:r>
-              <a:rPr lang="en-US" dirty="0" smtClean="0"/>
+              <a:rPr lang="en-US" dirty="0"/>
               <a:t>Click to edit Master title style</a:t>
             </a:r>
-            <a:endParaRPr lang="en-US" dirty="0"/>
           </a:p>
         </p:txBody>
       </p:sp>
@@ -4286,38 +4283,37 @@
           <a:p>
             <a:pPr lvl="0"/>
             <a:r>
-              <a:rPr lang="en-US" dirty="0" smtClean="0"/>
+              <a:rPr lang="en-US" dirty="0"/>
               <a:t>Click to edit Master text styles</a:t>
             </a:r>
           </a:p>
           <a:p>
             <a:pPr lvl="1"/>
             <a:r>
-              <a:rPr lang="en-US" dirty="0" smtClean="0"/>
+              <a:rPr lang="en-US" dirty="0"/>
               <a:t>Second level</a:t>
             </a:r>
           </a:p>
           <a:p>
             <a:pPr lvl="2"/>
             <a:r>
-              <a:rPr lang="en-US" dirty="0" smtClean="0"/>
+              <a:rPr lang="en-US" dirty="0"/>
               <a:t>Third level</a:t>
             </a:r>
           </a:p>
           <a:p>
             <a:pPr lvl="3"/>
             <a:r>
-              <a:rPr lang="en-US" dirty="0" smtClean="0"/>
+              <a:rPr lang="en-US" dirty="0"/>
               <a:t>Fourth level</a:t>
             </a:r>
           </a:p>
           <a:p>
             <a:pPr lvl="4"/>
             <a:r>
-              <a:rPr lang="en-US" dirty="0" smtClean="0"/>
+              <a:rPr lang="en-US" dirty="0"/>
               <a:t>Fifth level</a:t>
             </a:r>
-            <a:endParaRPr lang="en-US" dirty="0"/>
           </a:p>
         </p:txBody>
       </p:sp>
@@ -4814,10 +4810,6 @@
               <a:rPr lang="ro-RO" sz="4000" b="1" dirty="0"/>
               <a:t>3D Multiplayer Checkers with</a:t>
             </a:r>
-            <a:r>
-              <a:rPr lang="ro-RO" sz="4000" dirty="0"/>
-              <a:t/>
-            </a:r>
             <a:br>
               <a:rPr lang="ro-RO" sz="4000" dirty="0"/>
             </a:br>
@@ -4864,26 +4856,13 @@
           <a:p>
             <a:pPr algn="l"/>
             <a:r>
-              <a:rPr lang="ro-RO" sz="2000" dirty="0" smtClean="0">
-                <a:solidFill>
-                  <a:schemeClr val="tx1"/>
-                </a:solidFill>
-              </a:rPr>
-              <a:t>Conf.dr.ing</a:t>
-            </a:r>
-            <a:r>
               <a:rPr lang="ro-RO" sz="2000" dirty="0">
                 <a:solidFill>
                   <a:schemeClr val="tx1"/>
                 </a:solidFill>
               </a:rPr>
-              <a:t>. Robert-Gabriel Lupu</a:t>
-            </a:r>
-            <a:endParaRPr lang="ro-RO" sz="2000" dirty="0" smtClean="0">
-              <a:solidFill>
-                <a:schemeClr val="tx1"/>
-              </a:solidFill>
-            </a:endParaRPr>
+              <a:t>Conf.dr.ing. Robert-Gabriel Lupu</a:t>
+            </a:r>
           </a:p>
           <a:p>
             <a:pPr algn="r"/>
@@ -4930,13 +4909,6 @@
   <p:clrMapOvr>
     <a:masterClrMapping/>
   </p:clrMapOvr>
-  <p:timing>
-    <p:tnLst>
-      <p:par>
-        <p:cTn id="1" dur="indefinite" restart="never" nodeType="tmRoot"/>
-      </p:par>
-    </p:tnLst>
-  </p:timing>
 </p:sld>
 </file>
 
@@ -4973,19 +4945,19 @@
           <a:lstStyle/>
           <a:p>
             <a:r>
-              <a:rPr lang="en-US" dirty="0" err="1" smtClean="0"/>
+              <a:rPr lang="en-US" dirty="0" err="1"/>
               <a:t>Etapele</a:t>
             </a:r>
             <a:r>
-              <a:rPr lang="en-US" dirty="0" smtClean="0"/>
+              <a:rPr lang="en-US" dirty="0"/>
               <a:t> implement</a:t>
             </a:r>
             <a:r>
-              <a:rPr lang="ro-RO" dirty="0" smtClean="0"/>
+              <a:rPr lang="ro-RO" dirty="0"/>
               <a:t>ă</a:t>
             </a:r>
             <a:r>
-              <a:rPr lang="en-US" dirty="0" err="1" smtClean="0"/>
+              <a:rPr lang="en-US" dirty="0" err="1"/>
               <a:t>rii</a:t>
             </a:r>
             <a:endParaRPr lang="ro-RO" dirty="0"/>
@@ -5015,153 +4987,201 @@
           <a:lstStyle/>
           <a:p>
             <a:r>
-              <a:rPr lang="en-US" dirty="0" err="1" smtClean="0"/>
+              <a:rPr lang="en-US" dirty="0" err="1"/>
               <a:t>Definirea</a:t>
             </a:r>
             <a:r>
-              <a:rPr lang="en-US" dirty="0" smtClean="0"/>
+              <a:rPr lang="en-US" dirty="0"/>
+              <a:t> spa</a:t>
+            </a:r>
+            <a:r>
+              <a:rPr lang="ro-RO" dirty="0"/>
+              <a:t>ț</a:t>
+            </a:r>
+            <a:r>
+              <a:rPr lang="en-US" dirty="0" err="1"/>
+              <a:t>iului</a:t>
+            </a:r>
+            <a:r>
+              <a:rPr lang="en-US" dirty="0"/>
+              <a:t> de </a:t>
+            </a:r>
+            <a:r>
+              <a:rPr lang="en-US" dirty="0" err="1"/>
+              <a:t>interac</a:t>
+            </a:r>
+            <a:r>
+              <a:rPr lang="ro-RO" dirty="0"/>
+              <a:t>ț</a:t>
+            </a:r>
+            <a:r>
+              <a:rPr lang="en-US" dirty="0" err="1"/>
+              <a:t>iune</a:t>
+            </a:r>
+            <a:r>
+              <a:rPr lang="en-US" dirty="0"/>
+              <a:t> virtual</a:t>
+            </a:r>
+          </a:p>
+          <a:p>
+            <a:r>
+              <a:rPr lang="en-US" dirty="0" err="1"/>
+              <a:t>Inlocuirea</a:t>
+            </a:r>
+            <a:r>
+              <a:rPr lang="en-US" dirty="0"/>
               <a:t> </a:t>
             </a:r>
             <a:r>
-              <a:rPr lang="en-US" dirty="0" err="1" smtClean="0"/>
-              <a:t>spatiului</a:t>
-            </a:r>
-            <a:r>
-              <a:rPr lang="en-US" dirty="0" smtClean="0"/>
-              <a:t> de </a:t>
-            </a:r>
-            <a:r>
-              <a:rPr lang="en-US" dirty="0" err="1" smtClean="0"/>
-              <a:t>interactiune</a:t>
-            </a:r>
-            <a:r>
-              <a:rPr lang="en-US" dirty="0" smtClean="0"/>
-              <a:t> virtual</a:t>
-            </a:r>
-          </a:p>
-          <a:p>
-            <a:r>
-              <a:rPr lang="en-US" dirty="0" err="1" smtClean="0"/>
-              <a:t>Inlocuirea</a:t>
-            </a:r>
-            <a:r>
-              <a:rPr lang="en-US" dirty="0" smtClean="0"/>
+              <a:rPr lang="en-US" dirty="0" err="1"/>
+              <a:t>interac</a:t>
+            </a:r>
+            <a:r>
+              <a:rPr lang="ro-RO" dirty="0"/>
+              <a:t>ț</a:t>
+            </a:r>
+            <a:r>
+              <a:rPr lang="en-US" dirty="0" err="1"/>
+              <a:t>iunii</a:t>
+            </a:r>
+            <a:r>
+              <a:rPr lang="en-US" dirty="0"/>
               <a:t> </a:t>
             </a:r>
             <a:r>
-              <a:rPr lang="en-US" dirty="0" err="1" smtClean="0"/>
-              <a:t>interactiunii</a:t>
-            </a:r>
-            <a:r>
-              <a:rPr lang="en-US" dirty="0" smtClean="0"/>
+              <a:rPr lang="en-US" dirty="0" err="1"/>
+              <a:t>prin</a:t>
+            </a:r>
+            <a:r>
+              <a:rPr lang="en-US" dirty="0"/>
+              <a:t> mouse cu </a:t>
+            </a:r>
+            <a:r>
+              <a:rPr lang="en-US" dirty="0" err="1"/>
+              <a:t>interac</a:t>
+            </a:r>
+            <a:r>
+              <a:rPr lang="ro-RO" dirty="0"/>
+              <a:t>ț</a:t>
+            </a:r>
+            <a:r>
+              <a:rPr lang="en-US" dirty="0" err="1"/>
+              <a:t>iune</a:t>
+            </a:r>
+            <a:r>
+              <a:rPr lang="en-US" dirty="0"/>
               <a:t> </a:t>
             </a:r>
             <a:r>
-              <a:rPr lang="en-US" dirty="0" err="1" smtClean="0"/>
+              <a:rPr lang="en-US" dirty="0" err="1"/>
               <a:t>prin</a:t>
             </a:r>
             <a:r>
-              <a:rPr lang="en-US" dirty="0" smtClean="0"/>
-              <a:t> mouse cu </a:t>
-            </a:r>
-            <a:r>
-              <a:rPr lang="en-US" dirty="0" err="1" smtClean="0"/>
-              <a:t>interactiune</a:t>
-            </a:r>
-            <a:r>
-              <a:rPr lang="en-US" dirty="0" smtClean="0"/>
+              <a:rPr lang="en-US" dirty="0"/>
+              <a:t> mi</a:t>
+            </a:r>
+            <a:r>
+              <a:rPr lang="ro-RO" dirty="0"/>
+              <a:t>ș</a:t>
+            </a:r>
+            <a:r>
+              <a:rPr lang="en-US" dirty="0"/>
+              <a:t>c</a:t>
+            </a:r>
+            <a:r>
+              <a:rPr lang="ro-RO" dirty="0"/>
+              <a:t>ă</a:t>
+            </a:r>
+            <a:r>
+              <a:rPr lang="en-US" dirty="0" err="1"/>
+              <a:t>ri</a:t>
+            </a:r>
+            <a:r>
+              <a:rPr lang="en-US" dirty="0"/>
+              <a:t> ale m</a:t>
+            </a:r>
+            <a:r>
+              <a:rPr lang="ro-RO" dirty="0"/>
+              <a:t>â</a:t>
+            </a:r>
+            <a:r>
+              <a:rPr lang="en-US" dirty="0" err="1"/>
+              <a:t>inii</a:t>
+            </a:r>
+            <a:endParaRPr lang="en-US" dirty="0"/>
+          </a:p>
+          <a:p>
+            <a:r>
+              <a:rPr lang="en-US" dirty="0" err="1"/>
+              <a:t>Schelet</a:t>
+            </a:r>
+            <a:r>
+              <a:rPr lang="en-US" dirty="0"/>
               <a:t> </a:t>
             </a:r>
             <a:r>
-              <a:rPr lang="en-US" dirty="0" err="1" smtClean="0"/>
-              <a:t>prin</a:t>
-            </a:r>
-            <a:r>
-              <a:rPr lang="en-US" dirty="0" smtClean="0"/>
+              <a:rPr lang="en-US" dirty="0" err="1"/>
+              <a:t>pentru</a:t>
+            </a:r>
+            <a:r>
+              <a:rPr lang="en-US" dirty="0"/>
               <a:t> </a:t>
             </a:r>
             <a:r>
-              <a:rPr lang="en-US" dirty="0" err="1" smtClean="0"/>
-              <a:t>miscari</a:t>
-            </a:r>
-            <a:r>
-              <a:rPr lang="en-US" dirty="0" smtClean="0"/>
-              <a:t> ale </a:t>
-            </a:r>
-            <a:r>
-              <a:rPr lang="en-US" dirty="0" err="1" smtClean="0"/>
-              <a:t>mainii</a:t>
-            </a:r>
-            <a:endParaRPr lang="en-US" dirty="0" smtClean="0"/>
-          </a:p>
-          <a:p>
-            <a:r>
-              <a:rPr lang="en-US" dirty="0" err="1" smtClean="0"/>
-              <a:t>Schelet</a:t>
-            </a:r>
-            <a:r>
-              <a:rPr lang="en-US" dirty="0" smtClean="0"/>
+              <a:rPr lang="en-US" dirty="0" err="1"/>
+              <a:t>documentatie</a:t>
+            </a:r>
+            <a:endParaRPr lang="en-US" dirty="0"/>
+          </a:p>
+          <a:p>
+            <a:r>
+              <a:rPr lang="en-US" dirty="0" err="1"/>
+              <a:t>Finalizarea</a:t>
+            </a:r>
+            <a:r>
+              <a:rPr lang="en-US" dirty="0"/>
               <a:t> </a:t>
             </a:r>
             <a:r>
-              <a:rPr lang="en-US" dirty="0" err="1" smtClean="0"/>
-              <a:t>pentru</a:t>
-            </a:r>
-            <a:r>
-              <a:rPr lang="en-US" dirty="0" smtClean="0"/>
+              <a:rPr lang="ro-RO" dirty="0" err="1"/>
+              <a:t>ș</a:t>
+            </a:r>
+            <a:r>
+              <a:rPr lang="en-US" dirty="0" err="1"/>
+              <a:t>i</a:t>
+            </a:r>
+            <a:r>
+              <a:rPr lang="en-US" dirty="0"/>
               <a:t> </a:t>
             </a:r>
             <a:r>
-              <a:rPr lang="en-US" dirty="0" err="1" smtClean="0"/>
-              <a:t>documentatie</a:t>
-            </a:r>
-            <a:endParaRPr lang="en-US" dirty="0" smtClean="0"/>
-          </a:p>
-          <a:p>
-            <a:r>
-              <a:rPr lang="en-US" dirty="0" err="1" smtClean="0"/>
-              <a:t>Finalizarea</a:t>
-            </a:r>
-            <a:r>
-              <a:rPr lang="en-US" dirty="0" smtClean="0"/>
+              <a:rPr lang="en-US" dirty="0" err="1"/>
+              <a:t>rafinarea</a:t>
+            </a:r>
+            <a:r>
+              <a:rPr lang="en-US" dirty="0"/>
+              <a:t> par</a:t>
+            </a:r>
+            <a:r>
+              <a:rPr lang="ro-RO" dirty="0"/>
+              <a:t>ț</a:t>
+            </a:r>
+            <a:r>
+              <a:rPr lang="en-US" dirty="0"/>
+              <a:t>ii practice</a:t>
+            </a:r>
+          </a:p>
+          <a:p>
+            <a:r>
+              <a:rPr lang="en-US" dirty="0" err="1"/>
+              <a:t>Testarea</a:t>
+            </a:r>
+            <a:r>
+              <a:rPr lang="en-US" dirty="0"/>
               <a:t> </a:t>
             </a:r>
             <a:r>
-              <a:rPr lang="en-US" dirty="0" err="1" smtClean="0"/>
-              <a:t>si</a:t>
-            </a:r>
-            <a:r>
-              <a:rPr lang="en-US" dirty="0" smtClean="0"/>
-              <a:t> </a:t>
-            </a:r>
-            <a:r>
-              <a:rPr lang="en-US" dirty="0" err="1" smtClean="0"/>
-              <a:t>rafinarea</a:t>
-            </a:r>
-            <a:r>
-              <a:rPr lang="en-US" dirty="0" smtClean="0"/>
-              <a:t> </a:t>
-            </a:r>
-            <a:r>
-              <a:rPr lang="en-US" dirty="0" err="1" smtClean="0"/>
-              <a:t>partii</a:t>
-            </a:r>
-            <a:r>
-              <a:rPr lang="en-US" dirty="0" smtClean="0"/>
-              <a:t> practice</a:t>
-            </a:r>
-          </a:p>
-          <a:p>
-            <a:r>
-              <a:rPr lang="en-US" dirty="0" err="1" smtClean="0"/>
-              <a:t>Testarea</a:t>
-            </a:r>
-            <a:r>
-              <a:rPr lang="en-US" dirty="0" smtClean="0"/>
-              <a:t> </a:t>
-            </a:r>
-            <a:r>
-              <a:rPr lang="en-US" dirty="0" err="1" smtClean="0"/>
+              <a:rPr lang="en-US" dirty="0" err="1"/>
               <a:t>jocului</a:t>
             </a:r>
             <a:endParaRPr lang="ro-RO" dirty="0"/>
@@ -5211,7 +5231,7 @@
               <a:t>Săptămânile </a:t>
             </a:r>
             <a:r>
-              <a:rPr lang="en-US" sz="3200" b="1" dirty="0" smtClean="0"/>
+              <a:rPr lang="en-US" sz="3200" b="1" dirty="0"/>
               <a:t>8-12</a:t>
             </a:r>
             <a:endParaRPr lang="ro-RO" sz="3200" b="1" dirty="0"/>
@@ -5228,13 +5248,6 @@
   <p:clrMapOvr>
     <a:masterClrMapping/>
   </p:clrMapOvr>
-  <p:timing>
-    <p:tnLst>
-      <p:par>
-        <p:cTn id="1" dur="indefinite" restart="never" nodeType="tmRoot"/>
-      </p:par>
-    </p:tnLst>
-  </p:timing>
 </p:sld>
 </file>
 
@@ -5271,19 +5284,19 @@
           <a:lstStyle/>
           <a:p>
             <a:r>
-              <a:rPr lang="en-US" dirty="0" err="1" smtClean="0"/>
+              <a:rPr lang="en-US" dirty="0" err="1"/>
               <a:t>Etapele</a:t>
             </a:r>
             <a:r>
-              <a:rPr lang="en-US" dirty="0" smtClean="0"/>
+              <a:rPr lang="en-US" dirty="0"/>
               <a:t> implement</a:t>
             </a:r>
             <a:r>
-              <a:rPr lang="ro-RO" dirty="0" smtClean="0"/>
+              <a:rPr lang="ro-RO" dirty="0"/>
               <a:t>ă</a:t>
             </a:r>
             <a:r>
-              <a:rPr lang="en-US" dirty="0" err="1" smtClean="0"/>
+              <a:rPr lang="en-US" dirty="0" err="1"/>
               <a:t>rii</a:t>
             </a:r>
             <a:endParaRPr lang="ro-RO" dirty="0"/>
@@ -5313,119 +5326,195 @@
           <a:lstStyle/>
           <a:p>
             <a:r>
-              <a:rPr lang="en-US" dirty="0" err="1" smtClean="0"/>
+              <a:rPr lang="en-US" dirty="0" err="1"/>
               <a:t>Prezentarea</a:t>
             </a:r>
             <a:r>
-              <a:rPr lang="en-US" dirty="0" smtClean="0"/>
+              <a:rPr lang="en-US" dirty="0"/>
               <a:t> </a:t>
             </a:r>
             <a:r>
-              <a:rPr lang="en-US" dirty="0" err="1" smtClean="0"/>
-              <a:t>initiala</a:t>
-            </a:r>
-            <a:r>
-              <a:rPr lang="en-US" dirty="0" smtClean="0"/>
+              <a:rPr lang="en-US" dirty="0" err="1"/>
+              <a:t>ini</a:t>
+            </a:r>
+            <a:r>
+              <a:rPr lang="ro-RO" dirty="0"/>
+              <a:t>ț</a:t>
+            </a:r>
+            <a:r>
+              <a:rPr lang="en-US" dirty="0" err="1"/>
+              <a:t>ial</a:t>
+            </a:r>
+            <a:r>
+              <a:rPr lang="ro-RO" dirty="0"/>
+              <a:t>ă</a:t>
+            </a:r>
+            <a:r>
+              <a:rPr lang="en-US" dirty="0"/>
               <a:t> a </a:t>
             </a:r>
             <a:r>
-              <a:rPr lang="en-US" dirty="0" err="1" smtClean="0"/>
-              <a:t>aplicatiei</a:t>
-            </a:r>
-            <a:r>
-              <a:rPr lang="en-US" dirty="0" smtClean="0"/>
-              <a:t> (</a:t>
-            </a:r>
-            <a:r>
-              <a:rPr lang="en-US" dirty="0" err="1" smtClean="0"/>
-              <a:t>saptamana</a:t>
-            </a:r>
-            <a:r>
-              <a:rPr lang="en-US" dirty="0" smtClean="0"/>
+              <a:rPr lang="en-US" dirty="0" err="1"/>
+              <a:t>aplica</a:t>
+            </a:r>
+            <a:r>
+              <a:rPr lang="ro-RO" dirty="0"/>
+              <a:t>ț</a:t>
+            </a:r>
+            <a:r>
+              <a:rPr lang="en-US" dirty="0" err="1"/>
+              <a:t>iei</a:t>
+            </a:r>
+            <a:r>
+              <a:rPr lang="en-US" dirty="0"/>
+              <a:t> (s</a:t>
+            </a:r>
+            <a:r>
+              <a:rPr lang="ro-RO" dirty="0"/>
+              <a:t>ă</a:t>
+            </a:r>
+            <a:r>
+              <a:rPr lang="en-US" dirty="0" err="1"/>
+              <a:t>pt</a:t>
+            </a:r>
+            <a:r>
+              <a:rPr lang="ro-RO" dirty="0"/>
+              <a:t>ă</a:t>
+            </a:r>
+            <a:r>
+              <a:rPr lang="en-US" dirty="0"/>
+              <a:t>m</a:t>
+            </a:r>
+            <a:r>
+              <a:rPr lang="ro-RO" dirty="0"/>
+              <a:t>â</a:t>
+            </a:r>
+            <a:r>
+              <a:rPr lang="en-US" dirty="0" err="1"/>
+              <a:t>na</a:t>
+            </a:r>
+            <a:r>
+              <a:rPr lang="en-US" dirty="0"/>
               <a:t> 13)</a:t>
             </a:r>
           </a:p>
           <a:p>
             <a:r>
-              <a:rPr lang="en-US" dirty="0" err="1" smtClean="0"/>
+              <a:rPr lang="en-US" dirty="0" err="1"/>
               <a:t>Finalzarea</a:t>
             </a:r>
             <a:r>
-              <a:rPr lang="en-US" dirty="0" smtClean="0"/>
+              <a:rPr lang="en-US" dirty="0"/>
               <a:t> </a:t>
             </a:r>
             <a:r>
-              <a:rPr lang="en-US" dirty="0" err="1" smtClean="0"/>
+              <a:rPr lang="en-US" dirty="0" err="1"/>
               <a:t>tehnoredactarii</a:t>
             </a:r>
             <a:r>
-              <a:rPr lang="en-US" dirty="0" smtClean="0"/>
+              <a:rPr lang="en-US" dirty="0"/>
               <a:t> </a:t>
             </a:r>
             <a:r>
-              <a:rPr lang="en-US" dirty="0" err="1" smtClean="0"/>
+              <a:rPr lang="en-US" dirty="0" err="1"/>
               <a:t>documentatiei</a:t>
             </a:r>
-            <a:endParaRPr lang="en-US" dirty="0" smtClean="0"/>
-          </a:p>
-          <a:p>
-            <a:r>
-              <a:rPr lang="en-US" dirty="0" err="1" smtClean="0"/>
-              <a:t>Intocmirea</a:t>
-            </a:r>
-            <a:r>
-              <a:rPr lang="en-US" dirty="0" smtClean="0"/>
+            <a:endParaRPr lang="en-US" dirty="0"/>
+          </a:p>
+          <a:p>
+            <a:r>
+              <a:rPr lang="ro-RO" dirty="0" err="1"/>
+              <a:t>Î</a:t>
+            </a:r>
+            <a:r>
+              <a:rPr lang="en-US" dirty="0" err="1"/>
+              <a:t>ntocmirea</a:t>
+            </a:r>
+            <a:r>
+              <a:rPr lang="en-US" dirty="0"/>
               <a:t> </a:t>
             </a:r>
             <a:r>
-              <a:rPr lang="en-US" dirty="0" err="1" smtClean="0"/>
-              <a:t>prezentarii</a:t>
-            </a:r>
-            <a:r>
-              <a:rPr lang="en-US" dirty="0" smtClean="0"/>
+              <a:rPr lang="en-US" dirty="0" err="1"/>
+              <a:t>prezent</a:t>
+            </a:r>
+            <a:r>
+              <a:rPr lang="ro-RO" dirty="0"/>
+              <a:t>ă</a:t>
+            </a:r>
+            <a:r>
+              <a:rPr lang="en-US" dirty="0" err="1"/>
+              <a:t>rii</a:t>
+            </a:r>
+            <a:r>
+              <a:rPr lang="en-US" dirty="0"/>
               <a:t> Power Point </a:t>
             </a:r>
             <a:r>
-              <a:rPr lang="en-US" dirty="0" err="1" smtClean="0"/>
-              <a:t>si</a:t>
-            </a:r>
-            <a:r>
-              <a:rPr lang="en-US" dirty="0" smtClean="0"/>
+              <a:rPr lang="ro-RO" dirty="0" err="1"/>
+              <a:t>ș</a:t>
+            </a:r>
+            <a:r>
+              <a:rPr lang="en-US" dirty="0" err="1"/>
+              <a:t>i</a:t>
+            </a:r>
+            <a:r>
+              <a:rPr lang="en-US" dirty="0"/>
               <a:t> a </a:t>
             </a:r>
             <a:r>
-              <a:rPr lang="en-US" dirty="0" err="1" smtClean="0"/>
+              <a:rPr lang="en-US" dirty="0" err="1"/>
               <a:t>discursului</a:t>
             </a:r>
-            <a:endParaRPr lang="en-US" dirty="0" smtClean="0"/>
-          </a:p>
-          <a:p>
-            <a:r>
-              <a:rPr lang="en-US" dirty="0" err="1" smtClean="0"/>
-              <a:t>Sustinerea</a:t>
-            </a:r>
-            <a:r>
-              <a:rPr lang="en-US" dirty="0" smtClean="0"/>
+            <a:endParaRPr lang="en-US" dirty="0"/>
+          </a:p>
+          <a:p>
+            <a:r>
+              <a:rPr lang="en-US" dirty="0" err="1"/>
+              <a:t>Sus</a:t>
+            </a:r>
+            <a:r>
+              <a:rPr lang="ro-RO" dirty="0"/>
+              <a:t>ț</a:t>
+            </a:r>
+            <a:r>
+              <a:rPr lang="en-US" dirty="0" err="1"/>
+              <a:t>inerea</a:t>
+            </a:r>
+            <a:r>
+              <a:rPr lang="en-US" dirty="0"/>
               <a:t> </a:t>
             </a:r>
             <a:r>
-              <a:rPr lang="en-US" dirty="0" err="1" smtClean="0"/>
-              <a:t>prezentarii</a:t>
-            </a:r>
-            <a:r>
-              <a:rPr lang="en-US" dirty="0" smtClean="0"/>
+              <a:rPr lang="en-US" dirty="0" err="1"/>
+              <a:t>prezent</a:t>
+            </a:r>
+            <a:r>
+              <a:rPr lang="ro-RO" dirty="0"/>
+              <a:t>ă</a:t>
+            </a:r>
+            <a:r>
+              <a:rPr lang="en-US" dirty="0" err="1"/>
+              <a:t>rii</a:t>
+            </a:r>
+            <a:r>
+              <a:rPr lang="en-US" dirty="0"/>
               <a:t> </a:t>
             </a:r>
             <a:r>
-              <a:rPr lang="en-US" dirty="0" err="1" smtClean="0"/>
-              <a:t>si</a:t>
-            </a:r>
-            <a:r>
-              <a:rPr lang="en-US" dirty="0" smtClean="0"/>
+              <a:rPr lang="ro-RO" dirty="0" err="1"/>
+              <a:t>ș</a:t>
+            </a:r>
+            <a:r>
+              <a:rPr lang="en-US" dirty="0" err="1"/>
+              <a:t>i</a:t>
+            </a:r>
+            <a:r>
+              <a:rPr lang="en-US" dirty="0"/>
               <a:t> a demo-</a:t>
             </a:r>
             <a:r>
-              <a:rPr lang="en-US" dirty="0" err="1" smtClean="0"/>
+              <a:rPr lang="en-US" dirty="0" err="1"/>
               <a:t>ului</a:t>
             </a:r>
             <a:endParaRPr lang="ro-RO" dirty="0"/>
@@ -5475,7 +5564,7 @@
               <a:t>Săptămânile </a:t>
             </a:r>
             <a:r>
-              <a:rPr lang="en-US" sz="3200" b="1" dirty="0" smtClean="0"/>
+              <a:rPr lang="en-US" sz="3200" b="1" dirty="0"/>
               <a:t>13-14</a:t>
             </a:r>
             <a:endParaRPr lang="ro-RO" sz="3200" b="1" dirty="0"/>
@@ -5492,13 +5581,6 @@
   <p:clrMapOvr>
     <a:masterClrMapping/>
   </p:clrMapOvr>
-  <p:timing>
-    <p:tnLst>
-      <p:par>
-        <p:cTn id="1" dur="indefinite" restart="never" nodeType="tmRoot"/>
-      </p:par>
-    </p:tnLst>
-  </p:timing>
 </p:sld>
 </file>
 
@@ -5535,10 +5617,9 @@
           <a:lstStyle/>
           <a:p>
             <a:r>
-              <a:rPr lang="ro-RO" dirty="0" smtClean="0"/>
+              <a:rPr lang="ro-RO" dirty="0"/>
               <a:t>Concluzii</a:t>
             </a:r>
-            <a:endParaRPr lang="ro-RO" dirty="0"/>
           </a:p>
         </p:txBody>
       </p:sp>
@@ -5565,224 +5646,292 @@
           <a:lstStyle/>
           <a:p>
             <a:r>
-              <a:rPr lang="en-US" dirty="0" err="1" smtClean="0"/>
+              <a:rPr lang="en-US" dirty="0" err="1"/>
               <a:t>Jocul</a:t>
             </a:r>
             <a:r>
-              <a:rPr lang="en-US" dirty="0" smtClean="0"/>
+              <a:rPr lang="en-US" dirty="0"/>
               <a:t> a </a:t>
             </a:r>
             <a:r>
-              <a:rPr lang="en-US" dirty="0" err="1" smtClean="0"/>
+              <a:rPr lang="en-US" dirty="0" err="1"/>
               <a:t>fost</a:t>
             </a:r>
             <a:r>
-              <a:rPr lang="en-US" dirty="0" smtClean="0"/>
+              <a:rPr lang="en-US" dirty="0"/>
               <a:t> </a:t>
             </a:r>
             <a:r>
-              <a:rPr lang="en-US" dirty="0" err="1" smtClean="0"/>
+              <a:rPr lang="en-US" dirty="0" err="1"/>
               <a:t>implementat</a:t>
             </a:r>
             <a:r>
-              <a:rPr lang="en-US" dirty="0" smtClean="0"/>
+              <a:rPr lang="en-US" dirty="0"/>
               <a:t> cu </a:t>
             </a:r>
             <a:r>
-              <a:rPr lang="en-US" dirty="0" err="1" smtClean="0"/>
+              <a:rPr lang="en-US" dirty="0" err="1"/>
               <a:t>succes</a:t>
             </a:r>
-            <a:endParaRPr lang="en-US" dirty="0" smtClean="0"/>
-          </a:p>
-          <a:p>
-            <a:r>
-              <a:rPr lang="en-US" dirty="0" err="1" smtClean="0"/>
+            <a:endParaRPr lang="en-US" dirty="0"/>
+          </a:p>
+          <a:p>
+            <a:r>
+              <a:rPr lang="en-US" dirty="0" err="1"/>
               <a:t>Dupa</a:t>
             </a:r>
             <a:r>
-              <a:rPr lang="en-US" dirty="0" smtClean="0"/>
+              <a:rPr lang="en-US" dirty="0"/>
               <a:t> </a:t>
             </a:r>
             <a:r>
-              <a:rPr lang="en-US" dirty="0" err="1" smtClean="0"/>
-              <a:t>depasirea</a:t>
-            </a:r>
-            <a:r>
-              <a:rPr lang="en-US" dirty="0" smtClean="0"/>
+              <a:rPr lang="en-US" dirty="0" err="1"/>
+              <a:t>dep</a:t>
+            </a:r>
+            <a:r>
+              <a:rPr lang="ro-RO" dirty="0"/>
+              <a:t>ăș</a:t>
+            </a:r>
+            <a:r>
+              <a:rPr lang="en-US" dirty="0" err="1"/>
+              <a:t>irea</a:t>
+            </a:r>
+            <a:r>
+              <a:rPr lang="en-US" dirty="0"/>
               <a:t> </a:t>
             </a:r>
             <a:r>
-              <a:rPr lang="en-US" dirty="0" err="1" smtClean="0"/>
-              <a:t>dificultatilor</a:t>
-            </a:r>
-            <a:r>
-              <a:rPr lang="en-US" dirty="0" smtClean="0"/>
+              <a:rPr lang="en-US" dirty="0" err="1"/>
+              <a:t>dificult</a:t>
+            </a:r>
+            <a:r>
+              <a:rPr lang="ro-RO" dirty="0"/>
+              <a:t>ăț</a:t>
+            </a:r>
+            <a:r>
+              <a:rPr lang="en-US" dirty="0" err="1"/>
+              <a:t>ilor</a:t>
+            </a:r>
+            <a:r>
+              <a:rPr lang="en-US" dirty="0"/>
               <a:t>, </a:t>
             </a:r>
             <a:r>
-              <a:rPr lang="en-US" dirty="0" err="1" smtClean="0"/>
+              <a:rPr lang="en-US" dirty="0" err="1"/>
               <a:t>dezvoltarea</a:t>
             </a:r>
             <a:r>
-              <a:rPr lang="en-US" dirty="0" smtClean="0"/>
+              <a:rPr lang="en-US" dirty="0"/>
               <a:t> </a:t>
             </a:r>
             <a:r>
-              <a:rPr lang="en-US" dirty="0" err="1" smtClean="0"/>
+              <a:rPr lang="en-US" dirty="0" err="1"/>
               <a:t>aplicatiei</a:t>
             </a:r>
             <a:r>
-              <a:rPr lang="en-US" dirty="0" smtClean="0"/>
+              <a:rPr lang="en-US" dirty="0"/>
               <a:t> a </a:t>
             </a:r>
             <a:r>
-              <a:rPr lang="en-US" dirty="0" err="1" smtClean="0"/>
+              <a:rPr lang="en-US" dirty="0" err="1"/>
               <a:t>fost</a:t>
             </a:r>
             <a:r>
-              <a:rPr lang="en-US" dirty="0" smtClean="0"/>
+              <a:rPr lang="en-US" dirty="0"/>
               <a:t> </a:t>
             </a:r>
             <a:r>
-              <a:rPr lang="en-US" dirty="0" err="1" smtClean="0"/>
+              <a:rPr lang="en-US" dirty="0" err="1"/>
               <a:t>mult</a:t>
             </a:r>
             <a:r>
-              <a:rPr lang="en-US" dirty="0" smtClean="0"/>
+              <a:rPr lang="en-US" dirty="0"/>
               <a:t> </a:t>
             </a:r>
             <a:r>
-              <a:rPr lang="en-US" dirty="0" err="1" smtClean="0"/>
+              <a:rPr lang="en-US" dirty="0" err="1"/>
               <a:t>mai</a:t>
             </a:r>
             <a:r>
-              <a:rPr lang="en-US" dirty="0" smtClean="0"/>
+              <a:rPr lang="en-US" dirty="0"/>
               <a:t> </a:t>
             </a:r>
             <a:r>
-              <a:rPr lang="en-US" dirty="0" err="1" smtClean="0"/>
-              <a:t>facila</a:t>
-            </a:r>
-            <a:endParaRPr lang="en-US" dirty="0" smtClean="0"/>
-          </a:p>
-          <a:p>
-            <a:r>
-              <a:rPr lang="en-US" dirty="0" err="1" smtClean="0"/>
+              <a:rPr lang="en-US" dirty="0" err="1"/>
+              <a:t>facil</a:t>
+            </a:r>
+            <a:r>
+              <a:rPr lang="ro-RO" dirty="0"/>
+              <a:t>ă</a:t>
+            </a:r>
+            <a:endParaRPr lang="en-US" dirty="0"/>
+          </a:p>
+          <a:p>
+            <a:r>
+              <a:rPr lang="en-US" dirty="0" err="1"/>
               <a:t>Modul</a:t>
             </a:r>
             <a:r>
-              <a:rPr lang="en-US" dirty="0" smtClean="0"/>
+              <a:rPr lang="en-US" dirty="0"/>
               <a:t> de </a:t>
             </a:r>
             <a:r>
-              <a:rPr lang="en-US" dirty="0" err="1" smtClean="0"/>
-              <a:t>interactiune</a:t>
-            </a:r>
-            <a:r>
-              <a:rPr lang="en-US" dirty="0" smtClean="0"/>
+              <a:rPr lang="en-US" dirty="0" err="1"/>
+              <a:t>interac</a:t>
+            </a:r>
+            <a:r>
+              <a:rPr lang="ro-RO" dirty="0"/>
+              <a:t>ț</a:t>
+            </a:r>
+            <a:r>
+              <a:rPr lang="en-US" dirty="0" err="1"/>
+              <a:t>iune</a:t>
+            </a:r>
+            <a:r>
+              <a:rPr lang="en-US" dirty="0"/>
               <a:t> (</a:t>
             </a:r>
             <a:r>
-              <a:rPr lang="en-US" dirty="0" err="1" smtClean="0"/>
+              <a:rPr lang="en-US" dirty="0" err="1"/>
               <a:t>chiar</a:t>
             </a:r>
             <a:r>
-              <a:rPr lang="en-US" dirty="0" smtClean="0"/>
+              <a:rPr lang="en-US" dirty="0"/>
               <a:t> </a:t>
             </a:r>
             <a:r>
-              <a:rPr lang="en-US" dirty="0" err="1" smtClean="0"/>
-              <a:t>si</a:t>
-            </a:r>
-            <a:r>
-              <a:rPr lang="en-US" dirty="0" smtClean="0"/>
+              <a:rPr lang="ro-RO" dirty="0" err="1"/>
+              <a:t>ș</a:t>
+            </a:r>
+            <a:r>
+              <a:rPr lang="en-US" dirty="0" err="1"/>
+              <a:t>i</a:t>
+            </a:r>
+            <a:r>
+              <a:rPr lang="en-US" dirty="0"/>
               <a:t> </a:t>
             </a:r>
             <a:r>
-              <a:rPr lang="en-US" dirty="0" err="1" smtClean="0"/>
+              <a:rPr lang="en-US" dirty="0" err="1"/>
               <a:t>prin</a:t>
             </a:r>
             <a:r>
-              <a:rPr lang="en-US" dirty="0" smtClean="0"/>
+              <a:rPr lang="en-US" dirty="0"/>
               <a:t> </a:t>
             </a:r>
             <a:r>
-              <a:rPr lang="en-US" dirty="0" err="1" smtClean="0"/>
+              <a:rPr lang="en-US" dirty="0" err="1"/>
               <a:t>intermediul</a:t>
             </a:r>
             <a:r>
-              <a:rPr lang="en-US" dirty="0" smtClean="0"/>
+              <a:rPr lang="en-US" dirty="0"/>
               <a:t> Leap Motion) </a:t>
             </a:r>
             <a:r>
-              <a:rPr lang="en-US" dirty="0" err="1" smtClean="0"/>
+              <a:rPr lang="en-US" dirty="0" err="1"/>
               <a:t>poate</a:t>
             </a:r>
             <a:r>
-              <a:rPr lang="en-US" dirty="0" smtClean="0"/>
-              <a:t> fi ales in </a:t>
-            </a:r>
-            <a:r>
-              <a:rPr lang="en-US" dirty="0" err="1" smtClean="0"/>
+              <a:rPr lang="en-US" dirty="0"/>
+              <a:t> fi ales </a:t>
+            </a:r>
+            <a:r>
+              <a:rPr lang="ro-RO" dirty="0"/>
+              <a:t>î</a:t>
+            </a:r>
+            <a:r>
+              <a:rPr lang="en-US" dirty="0"/>
+              <a:t>n </a:t>
+            </a:r>
+            <a:r>
+              <a:rPr lang="en-US" dirty="0" err="1"/>
               <a:t>multe</a:t>
             </a:r>
             <a:r>
-              <a:rPr lang="en-US" dirty="0" smtClean="0"/>
+              <a:rPr lang="en-US" dirty="0"/>
               <a:t> </a:t>
             </a:r>
             <a:r>
-              <a:rPr lang="en-US" dirty="0" err="1" smtClean="0"/>
+              <a:rPr lang="en-US" dirty="0" err="1"/>
               <a:t>forme</a:t>
             </a:r>
             <a:r>
-              <a:rPr lang="en-US" dirty="0" smtClean="0"/>
-              <a:t>, in </a:t>
-            </a:r>
-            <a:r>
-              <a:rPr lang="en-US" dirty="0" err="1" smtClean="0"/>
-              <a:t>functie</a:t>
-            </a:r>
-            <a:r>
-              <a:rPr lang="en-US" dirty="0" smtClean="0"/>
+              <a:rPr lang="en-US" dirty="0"/>
+              <a:t>, </a:t>
+            </a:r>
+            <a:r>
+              <a:rPr lang="ro-RO" dirty="0"/>
+              <a:t>î</a:t>
+            </a:r>
+            <a:r>
+              <a:rPr lang="en-US" dirty="0"/>
+              <a:t>n </a:t>
+            </a:r>
+            <a:r>
+              <a:rPr lang="en-US" dirty="0" err="1"/>
+              <a:t>func</a:t>
+            </a:r>
+            <a:r>
+              <a:rPr lang="ro-RO" dirty="0"/>
+              <a:t>ț</a:t>
+            </a:r>
+            <a:r>
+              <a:rPr lang="en-US" dirty="0" err="1"/>
+              <a:t>ie</a:t>
+            </a:r>
+            <a:r>
+              <a:rPr lang="en-US" dirty="0"/>
               <a:t> de </a:t>
             </a:r>
             <a:r>
-              <a:rPr lang="en-US" dirty="0" err="1" smtClean="0"/>
+              <a:rPr lang="en-US" dirty="0" err="1"/>
               <a:t>ingeniozitate</a:t>
             </a:r>
             <a:r>
-              <a:rPr lang="en-US" dirty="0" smtClean="0"/>
+              <a:rPr lang="en-US" dirty="0"/>
               <a:t> </a:t>
             </a:r>
             <a:r>
-              <a:rPr lang="en-US" dirty="0" err="1" smtClean="0"/>
-              <a:t>si</a:t>
-            </a:r>
-            <a:r>
-              <a:rPr lang="en-US" dirty="0" smtClean="0"/>
+              <a:rPr lang="ro-RO" dirty="0" err="1"/>
+              <a:t>ș</a:t>
+            </a:r>
+            <a:r>
+              <a:rPr lang="en-US" dirty="0" err="1"/>
+              <a:t>i</a:t>
+            </a:r>
+            <a:r>
+              <a:rPr lang="en-US" dirty="0"/>
               <a:t> </a:t>
             </a:r>
             <a:r>
-              <a:rPr lang="en-US" dirty="0" err="1" smtClean="0"/>
+              <a:rPr lang="en-US" dirty="0" err="1"/>
               <a:t>raportat</a:t>
             </a:r>
             <a:r>
-              <a:rPr lang="en-US" dirty="0" smtClean="0"/>
+              <a:rPr lang="en-US" dirty="0"/>
               <a:t> la </a:t>
             </a:r>
             <a:r>
-              <a:rPr lang="en-US" dirty="0" err="1" smtClean="0"/>
+              <a:rPr lang="en-US" dirty="0" err="1"/>
               <a:t>complexitatea</a:t>
             </a:r>
             <a:r>
-              <a:rPr lang="en-US" dirty="0" smtClean="0"/>
+              <a:rPr lang="en-US" dirty="0"/>
               <a:t> </a:t>
             </a:r>
             <a:r>
-              <a:rPr lang="en-US" dirty="0" err="1" smtClean="0"/>
-              <a:t>tintita</a:t>
-            </a:r>
-            <a:endParaRPr lang="en-US" dirty="0" smtClean="0"/>
+              <a:rPr lang="ro-RO" dirty="0"/>
+              <a:t>ț</a:t>
+            </a:r>
+            <a:r>
+              <a:rPr lang="en-US" dirty="0" err="1"/>
+              <a:t>intit</a:t>
+            </a:r>
+            <a:r>
+              <a:rPr lang="ro-RO" dirty="0"/>
+              <a:t>ă</a:t>
+            </a:r>
+            <a:endParaRPr lang="en-US" dirty="0"/>
           </a:p>
         </p:txBody>
       </p:sp>
@@ -5796,13 +5945,6 @@
   <p:clrMapOvr>
     <a:masterClrMapping/>
   </p:clrMapOvr>
-  <p:timing>
-    <p:tnLst>
-      <p:par>
-        <p:cTn id="1" dur="indefinite" restart="never" nodeType="tmRoot"/>
-      </p:par>
-    </p:tnLst>
-  </p:timing>
 </p:sld>
 </file>
 
@@ -5839,10 +5981,9 @@
           <a:lstStyle/>
           <a:p>
             <a:r>
-              <a:rPr lang="ro-RO" dirty="0" smtClean="0"/>
+              <a:rPr lang="ro-RO" dirty="0"/>
               <a:t>Direcții de îmbunatățire</a:t>
             </a:r>
-            <a:endParaRPr lang="ro-RO" dirty="0"/>
           </a:p>
         </p:txBody>
       </p:sp>
@@ -5867,193 +6008,265 @@
               <a:buNone/>
             </a:pPr>
             <a:r>
-              <a:rPr lang="en-US" dirty="0" err="1" smtClean="0"/>
+              <a:rPr lang="en-US" dirty="0" err="1"/>
               <a:t>Pe</a:t>
             </a:r>
             <a:r>
-              <a:rPr lang="en-US" dirty="0" smtClean="0"/>
+              <a:rPr lang="en-US" dirty="0"/>
               <a:t> </a:t>
             </a:r>
             <a:r>
-              <a:rPr lang="en-US" dirty="0" err="1" smtClean="0"/>
+              <a:rPr lang="en-US" dirty="0" err="1"/>
               <a:t>parcursul</a:t>
             </a:r>
             <a:r>
-              <a:rPr lang="en-US" dirty="0" smtClean="0"/>
+              <a:rPr lang="en-US" dirty="0"/>
               <a:t> </a:t>
             </a:r>
             <a:r>
-              <a:rPr lang="en-US" dirty="0" err="1" smtClean="0"/>
+              <a:rPr lang="en-US" dirty="0" err="1"/>
               <a:t>dezvoltarii</a:t>
             </a:r>
             <a:r>
-              <a:rPr lang="en-US" dirty="0" smtClean="0"/>
+              <a:rPr lang="en-US" dirty="0"/>
               <a:t> </a:t>
             </a:r>
             <a:r>
-              <a:rPr lang="en-US" dirty="0" err="1" smtClean="0"/>
-              <a:t>aplicatii</a:t>
-            </a:r>
-            <a:r>
-              <a:rPr lang="en-US" dirty="0" smtClean="0"/>
+              <a:rPr lang="en-US" dirty="0" err="1"/>
+              <a:t>aplicati</a:t>
+            </a:r>
+            <a:r>
+              <a:rPr lang="ro-RO" dirty="0"/>
+              <a:t>e</a:t>
+            </a:r>
+            <a:r>
+              <a:rPr lang="en-US" dirty="0" err="1"/>
+              <a:t>i</a:t>
+            </a:r>
+            <a:r>
+              <a:rPr lang="en-US" dirty="0"/>
               <a:t> s-au </a:t>
             </a:r>
             <a:r>
-              <a:rPr lang="en-US" dirty="0" err="1" smtClean="0"/>
+              <a:rPr lang="en-US" dirty="0" err="1"/>
               <a:t>observat</a:t>
             </a:r>
             <a:r>
-              <a:rPr lang="en-US" dirty="0" smtClean="0"/>
+              <a:rPr lang="en-US" dirty="0"/>
               <a:t> </a:t>
             </a:r>
             <a:r>
-              <a:rPr lang="en-US" dirty="0" err="1" smtClean="0"/>
-              <a:t>oportunitati</a:t>
-            </a:r>
-            <a:r>
-              <a:rPr lang="en-US" dirty="0" smtClean="0"/>
+              <a:rPr lang="en-US" dirty="0" err="1"/>
+              <a:t>oportunit</a:t>
+            </a:r>
+            <a:r>
+              <a:rPr lang="ro-RO" dirty="0"/>
+              <a:t>ăț</a:t>
+            </a:r>
+            <a:r>
+              <a:rPr lang="en-US" dirty="0" err="1"/>
+              <a:t>i</a:t>
+            </a:r>
+            <a:r>
+              <a:rPr lang="en-US" dirty="0"/>
               <a:t> de </a:t>
             </a:r>
             <a:r>
-              <a:rPr lang="en-US" dirty="0" err="1" smtClean="0"/>
-              <a:t>imbunatatire</a:t>
-            </a:r>
-            <a:r>
-              <a:rPr lang="en-US" dirty="0" smtClean="0"/>
-              <a:t> a </a:t>
-            </a:r>
-            <a:r>
-              <a:rPr lang="en-US" dirty="0" err="1" smtClean="0"/>
-              <a:t>aplicatiei</a:t>
-            </a:r>
-            <a:r>
-              <a:rPr lang="en-US" dirty="0" smtClean="0"/>
-              <a:t> in </a:t>
-            </a:r>
-            <a:r>
-              <a:rPr lang="en-US" dirty="0" err="1" smtClean="0"/>
-              <a:t>urmatoarele</a:t>
-            </a:r>
-            <a:r>
-              <a:rPr lang="en-US" dirty="0" smtClean="0"/>
+              <a:rPr lang="ro-RO" dirty="0"/>
+              <a:t>î</a:t>
+            </a:r>
+            <a:r>
+              <a:rPr lang="en-US" dirty="0" err="1"/>
+              <a:t>mbun</a:t>
+            </a:r>
+            <a:r>
+              <a:rPr lang="ro-RO" dirty="0"/>
+              <a:t>ătăț</a:t>
+            </a:r>
+            <a:r>
+              <a:rPr lang="en-US" dirty="0"/>
+              <a:t>ire a </a:t>
+            </a:r>
+            <a:r>
+              <a:rPr lang="ro-RO" dirty="0"/>
+              <a:t>acesteia î</a:t>
+            </a:r>
+            <a:r>
+              <a:rPr lang="en-US" dirty="0"/>
+              <a:t>n </a:t>
+            </a:r>
+            <a:r>
+              <a:rPr lang="en-US" dirty="0" err="1"/>
+              <a:t>urm</a:t>
+            </a:r>
+            <a:r>
+              <a:rPr lang="ro-RO" dirty="0"/>
+              <a:t>ă</a:t>
+            </a:r>
+            <a:r>
+              <a:rPr lang="en-US" dirty="0" err="1"/>
+              <a:t>toarele</a:t>
+            </a:r>
+            <a:r>
+              <a:rPr lang="en-US" dirty="0"/>
               <a:t> </a:t>
             </a:r>
             <a:r>
-              <a:rPr lang="en-US" dirty="0" err="1" smtClean="0"/>
-              <a:t>privinte</a:t>
-            </a:r>
-            <a:r>
-              <a:rPr lang="en-US" dirty="0" smtClean="0"/>
-              <a:t>:</a:t>
+              <a:rPr lang="en-US" dirty="0" err="1"/>
+              <a:t>privin</a:t>
+            </a:r>
+            <a:r>
+              <a:rPr lang="ro-RO" dirty="0"/>
+              <a:t>ț</a:t>
+            </a:r>
+            <a:r>
+              <a:rPr lang="en-US" dirty="0"/>
+              <a:t>e:</a:t>
             </a:r>
           </a:p>
           <a:p>
             <a:pPr marL="0" indent="0">
               <a:buNone/>
             </a:pPr>
-            <a:endParaRPr lang="en-US" dirty="0" smtClean="0"/>
-          </a:p>
-          <a:p>
-            <a:r>
-              <a:rPr lang="en-US" dirty="0" err="1" smtClean="0"/>
+            <a:endParaRPr lang="en-US" dirty="0"/>
+          </a:p>
+          <a:p>
+            <a:r>
+              <a:rPr lang="en-US" dirty="0" err="1"/>
               <a:t>Medierea</a:t>
             </a:r>
             <a:r>
-              <a:rPr lang="en-US" dirty="0" smtClean="0"/>
+              <a:rPr lang="en-US" dirty="0"/>
               <a:t> </a:t>
             </a:r>
             <a:r>
-              <a:rPr lang="en-US" dirty="0" err="1" smtClean="0"/>
+              <a:rPr lang="en-US" dirty="0" err="1"/>
               <a:t>ultimelor</a:t>
             </a:r>
             <a:r>
-              <a:rPr lang="en-US" dirty="0" smtClean="0"/>
+              <a:rPr lang="en-US" dirty="0"/>
               <a:t> </a:t>
             </a:r>
             <a:r>
-              <a:rPr lang="en-US" dirty="0" err="1" smtClean="0"/>
-              <a:t>pozitii</a:t>
-            </a:r>
-            <a:r>
-              <a:rPr lang="en-US" dirty="0" smtClean="0"/>
-              <a:t> ale </a:t>
-            </a:r>
-            <a:r>
-              <a:rPr lang="en-US" dirty="0" err="1" smtClean="0"/>
-              <a:t>mainii</a:t>
-            </a:r>
-            <a:r>
-              <a:rPr lang="en-US" dirty="0" smtClean="0"/>
+              <a:rPr lang="en-US" dirty="0" err="1"/>
+              <a:t>pozi</a:t>
+            </a:r>
+            <a:r>
+              <a:rPr lang="ro-RO" dirty="0"/>
+              <a:t>ț</a:t>
+            </a:r>
+            <a:r>
+              <a:rPr lang="en-US" dirty="0"/>
+              <a:t>ii ale m</a:t>
+            </a:r>
+            <a:r>
+              <a:rPr lang="ro-RO" dirty="0"/>
+              <a:t>â</a:t>
+            </a:r>
+            <a:r>
+              <a:rPr lang="en-US" dirty="0" err="1"/>
+              <a:t>inii</a:t>
+            </a:r>
+            <a:r>
+              <a:rPr lang="en-US" dirty="0"/>
               <a:t> </a:t>
             </a:r>
             <a:r>
-              <a:rPr lang="en-US" dirty="0" err="1" smtClean="0"/>
+              <a:rPr lang="en-US" dirty="0" err="1"/>
               <a:t>pentru</a:t>
             </a:r>
             <a:r>
-              <a:rPr lang="en-US" dirty="0" smtClean="0"/>
+              <a:rPr lang="en-US" dirty="0"/>
               <a:t> a </a:t>
             </a:r>
             <a:r>
-              <a:rPr lang="en-US" dirty="0" err="1" smtClean="0"/>
+              <a:rPr lang="en-US" dirty="0" err="1"/>
               <a:t>elimina</a:t>
             </a:r>
             <a:r>
-              <a:rPr lang="en-US" dirty="0" smtClean="0"/>
+              <a:rPr lang="en-US" dirty="0"/>
               <a:t> </a:t>
             </a:r>
             <a:r>
-              <a:rPr lang="en-US" dirty="0" err="1" smtClean="0"/>
+              <a:rPr lang="en-US" dirty="0" err="1"/>
               <a:t>tremuratul</a:t>
             </a:r>
-            <a:endParaRPr lang="en-US" dirty="0" smtClean="0"/>
-          </a:p>
-          <a:p>
-            <a:r>
-              <a:rPr lang="en-US" dirty="0" err="1" smtClean="0"/>
+            <a:endParaRPr lang="en-US" dirty="0"/>
+          </a:p>
+          <a:p>
+            <a:r>
+              <a:rPr lang="en-US" dirty="0" err="1"/>
               <a:t>Maparea</a:t>
             </a:r>
             <a:r>
-              <a:rPr lang="en-US" dirty="0" smtClean="0"/>
+              <a:rPr lang="en-US" dirty="0"/>
               <a:t> </a:t>
             </a:r>
             <a:r>
-              <a:rPr lang="en-US" dirty="0" err="1" smtClean="0"/>
-              <a:t>pozitiei</a:t>
-            </a:r>
-            <a:r>
-              <a:rPr lang="en-US" dirty="0" smtClean="0"/>
+              <a:rPr lang="en-US" dirty="0" err="1"/>
+              <a:t>pozi</a:t>
+            </a:r>
+            <a:r>
+              <a:rPr lang="ro-RO" dirty="0"/>
+              <a:t>ț</a:t>
+            </a:r>
+            <a:r>
+              <a:rPr lang="en-US" dirty="0" err="1"/>
+              <a:t>iei</a:t>
+            </a:r>
+            <a:r>
+              <a:rPr lang="en-US" dirty="0"/>
               <a:t> </a:t>
             </a:r>
             <a:r>
-              <a:rPr lang="en-US" dirty="0" err="1" smtClean="0"/>
-              <a:t>tinand</a:t>
-            </a:r>
-            <a:r>
-              <a:rPr lang="en-US" dirty="0" smtClean="0"/>
+              <a:rPr lang="ro-RO" dirty="0" err="1"/>
+              <a:t>ț</a:t>
+            </a:r>
+            <a:r>
+              <a:rPr lang="en-US" dirty="0" err="1"/>
+              <a:t>inand</a:t>
+            </a:r>
+            <a:r>
+              <a:rPr lang="en-US" dirty="0"/>
               <a:t> </a:t>
             </a:r>
             <a:r>
-              <a:rPr lang="en-US" dirty="0" err="1" smtClean="0"/>
+              <a:rPr lang="en-US" dirty="0" err="1"/>
               <a:t>cont</a:t>
             </a:r>
             <a:r>
-              <a:rPr lang="en-US" dirty="0" smtClean="0"/>
+              <a:rPr lang="en-US" dirty="0"/>
               <a:t> </a:t>
             </a:r>
             <a:r>
-              <a:rPr lang="en-US" dirty="0" err="1" smtClean="0"/>
-              <a:t>si</a:t>
-            </a:r>
-            <a:r>
-              <a:rPr lang="en-US" dirty="0" smtClean="0"/>
+              <a:rPr lang="ro-RO" dirty="0" err="1"/>
+              <a:t>ș</a:t>
+            </a:r>
+            <a:r>
+              <a:rPr lang="en-US" dirty="0" err="1"/>
+              <a:t>i</a:t>
+            </a:r>
+            <a:r>
+              <a:rPr lang="en-US" dirty="0"/>
               <a:t> de </a:t>
             </a:r>
             <a:r>
-              <a:rPr lang="en-US" dirty="0" err="1" smtClean="0"/>
-              <a:t>inaltime</a:t>
-            </a:r>
-            <a:endParaRPr lang="en-US" dirty="0" smtClean="0"/>
+              <a:rPr lang="ro-RO" dirty="0"/>
+              <a:t>î</a:t>
+            </a:r>
+            <a:r>
+              <a:rPr lang="en-US" dirty="0" err="1"/>
+              <a:t>nal</a:t>
+            </a:r>
+            <a:r>
+              <a:rPr lang="ro-RO" dirty="0"/>
+              <a:t>ț</a:t>
+            </a:r>
+            <a:r>
+              <a:rPr lang="en-US" dirty="0" err="1"/>
+              <a:t>ime</a:t>
+            </a:r>
+            <a:endParaRPr lang="en-US" dirty="0"/>
           </a:p>
         </p:txBody>
       </p:sp>
@@ -6067,13 +6280,6 @@
   <p:clrMapOvr>
     <a:masterClrMapping/>
   </p:clrMapOvr>
-  <p:timing>
-    <p:tnLst>
-      <p:par>
-        <p:cTn id="1" dur="indefinite" restart="never" nodeType="tmRoot"/>
-      </p:par>
-    </p:tnLst>
-  </p:timing>
 </p:sld>
 </file>
 
@@ -6110,10 +6316,9 @@
           <a:lstStyle/>
           <a:p>
             <a:r>
-              <a:rPr lang="ro-RO" dirty="0" smtClean="0"/>
+              <a:rPr lang="ro-RO" dirty="0"/>
               <a:t>Direcții de îmbunatățire</a:t>
             </a:r>
-            <a:endParaRPr lang="ro-RO" dirty="0"/>
           </a:p>
         </p:txBody>
       </p:sp>
@@ -6172,7 +6377,15 @@
             </a:r>
             <a:r>
               <a:rPr lang="en-US" dirty="0"/>
-              <a:t> in </a:t>
+              <a:t> </a:t>
+            </a:r>
+            <a:r>
+              <a:rPr lang="ro-RO" dirty="0"/>
+              <a:t>î</a:t>
+            </a:r>
+            <a:r>
+              <a:rPr lang="en-US" dirty="0"/>
+              <a:t>n </a:t>
             </a:r>
             <a:r>
               <a:rPr lang="en-US" dirty="0" err="1"/>
@@ -6191,157 +6404,201 @@
               <a:t>/a </a:t>
             </a:r>
             <a:r>
-              <a:rPr lang="en-US" dirty="0" err="1" smtClean="0"/>
+              <a:rPr lang="en-US" dirty="0" err="1"/>
               <a:t>rundei</a:t>
             </a:r>
-            <a:endParaRPr lang="en-US" dirty="0" smtClean="0"/>
-          </a:p>
-          <a:p>
-            <a:r>
-              <a:rPr lang="en-US" dirty="0" err="1" smtClean="0"/>
+            <a:endParaRPr lang="en-US" dirty="0"/>
+          </a:p>
+          <a:p>
+            <a:r>
+              <a:rPr lang="en-US" dirty="0" err="1"/>
               <a:t>Implementarea</a:t>
             </a:r>
             <a:r>
-              <a:rPr lang="en-US" dirty="0" smtClean="0"/>
+              <a:rPr lang="en-US" dirty="0"/>
               <a:t> </a:t>
             </a:r>
             <a:r>
-              <a:rPr lang="en-US" dirty="0" err="1" smtClean="0"/>
+              <a:rPr lang="en-US" dirty="0" err="1"/>
               <a:t>unui</a:t>
             </a:r>
             <a:r>
-              <a:rPr lang="en-US" dirty="0" smtClean="0"/>
+              <a:rPr lang="en-US" dirty="0"/>
               <a:t> </a:t>
             </a:r>
             <a:r>
-              <a:rPr lang="en-US" dirty="0" err="1" smtClean="0"/>
+              <a:rPr lang="en-US" dirty="0" err="1"/>
               <a:t>meniu</a:t>
             </a:r>
             <a:r>
-              <a:rPr lang="en-US" dirty="0" smtClean="0"/>
+              <a:rPr lang="en-US" dirty="0"/>
               <a:t> </a:t>
             </a:r>
             <a:r>
-              <a:rPr lang="en-US" dirty="0" err="1" smtClean="0"/>
+              <a:rPr lang="en-US" dirty="0" err="1"/>
               <a:t>interactiv</a:t>
             </a:r>
             <a:r>
-              <a:rPr lang="en-US" dirty="0" smtClean="0"/>
+              <a:rPr lang="en-US" dirty="0"/>
               <a:t> (ex. </a:t>
             </a:r>
             <a:r>
-              <a:rPr lang="en-US" dirty="0"/>
-              <a:t>i</a:t>
-            </a:r>
-            <a:r>
-              <a:rPr lang="en-US" dirty="0" smtClean="0"/>
-              <a:t>n </a:t>
-            </a:r>
-            <a:r>
-              <a:rPr lang="en-US" dirty="0" err="1" smtClean="0"/>
-              <a:t>palma</a:t>
-            </a:r>
-            <a:r>
-              <a:rPr lang="en-US" dirty="0" smtClean="0"/>
+              <a:rPr lang="ro-RO" dirty="0"/>
+              <a:t>î</a:t>
+            </a:r>
+            <a:r>
+              <a:rPr lang="en-US" dirty="0"/>
+              <a:t>n palm</a:t>
+            </a:r>
+            <a:r>
+              <a:rPr lang="ro-RO" dirty="0"/>
+              <a:t>ă</a:t>
+            </a:r>
+            <a:r>
+              <a:rPr lang="en-US" dirty="0"/>
               <a:t>)</a:t>
             </a:r>
           </a:p>
           <a:p>
             <a:r>
-              <a:rPr lang="en-US" dirty="0" err="1" smtClean="0"/>
-              <a:t>Adaugarea</a:t>
-            </a:r>
-            <a:r>
-              <a:rPr lang="en-US" dirty="0" smtClean="0"/>
+              <a:rPr lang="en-US" dirty="0"/>
+              <a:t>Ad</a:t>
+            </a:r>
+            <a:r>
+              <a:rPr lang="ro-RO" dirty="0"/>
+              <a:t>ă</a:t>
+            </a:r>
+            <a:r>
+              <a:rPr lang="en-US" dirty="0" err="1"/>
+              <a:t>ugarea</a:t>
+            </a:r>
+            <a:r>
+              <a:rPr lang="en-US" dirty="0"/>
               <a:t> </a:t>
             </a:r>
             <a:r>
-              <a:rPr lang="en-US" dirty="0" err="1" smtClean="0"/>
-              <a:t>functionalitatii</a:t>
-            </a:r>
-            <a:r>
-              <a:rPr lang="en-US" dirty="0" smtClean="0"/>
+              <a:rPr lang="en-US" dirty="0" err="1"/>
+              <a:t>func</a:t>
+            </a:r>
+            <a:r>
+              <a:rPr lang="ro-RO" dirty="0"/>
+              <a:t>ț</a:t>
+            </a:r>
+            <a:r>
+              <a:rPr lang="en-US" dirty="0" err="1"/>
+              <a:t>ionalitatii</a:t>
+            </a:r>
+            <a:r>
+              <a:rPr lang="en-US" dirty="0"/>
               <a:t> de </a:t>
             </a:r>
             <a:r>
-              <a:rPr lang="en-US" dirty="0" err="1" smtClean="0"/>
-              <a:t>comunicatie</a:t>
-            </a:r>
-            <a:r>
-              <a:rPr lang="en-US" dirty="0" smtClean="0"/>
-              <a:t> in </a:t>
-            </a:r>
-            <a:r>
-              <a:rPr lang="en-US" dirty="0" err="1" smtClean="0"/>
-              <a:t>retea</a:t>
-            </a:r>
-            <a:r>
-              <a:rPr lang="en-US" dirty="0" smtClean="0"/>
-              <a:t> (</a:t>
-            </a:r>
-            <a:r>
-              <a:rPr lang="en-US" dirty="0" err="1" smtClean="0"/>
-              <a:t>socketuri</a:t>
-            </a:r>
-            <a:r>
-              <a:rPr lang="en-US" dirty="0" smtClean="0"/>
+              <a:rPr lang="en-US" dirty="0" err="1"/>
+              <a:t>comunica</a:t>
+            </a:r>
+            <a:r>
+              <a:rPr lang="ro-RO" dirty="0"/>
+              <a:t>ț</a:t>
+            </a:r>
+            <a:r>
+              <a:rPr lang="en-US" dirty="0" err="1"/>
+              <a:t>ie</a:t>
+            </a:r>
+            <a:r>
+              <a:rPr lang="en-US" dirty="0"/>
+              <a:t> </a:t>
+            </a:r>
+            <a:r>
+              <a:rPr lang="ro-RO" dirty="0"/>
+              <a:t>î</a:t>
+            </a:r>
+            <a:r>
+              <a:rPr lang="en-US" dirty="0"/>
+              <a:t>n re</a:t>
+            </a:r>
+            <a:r>
+              <a:rPr lang="ro-RO" dirty="0"/>
+              <a:t>ț</a:t>
+            </a:r>
+            <a:r>
+              <a:rPr lang="en-US" dirty="0" err="1"/>
+              <a:t>ea</a:t>
+            </a:r>
+            <a:r>
+              <a:rPr lang="en-US" dirty="0"/>
+              <a:t> (socket</a:t>
+            </a:r>
+            <a:r>
+              <a:rPr lang="ro-RO" dirty="0"/>
+              <a:t>-</a:t>
+            </a:r>
+            <a:r>
+              <a:rPr lang="en-US" dirty="0" err="1"/>
+              <a:t>uri</a:t>
+            </a:r>
+            <a:r>
+              <a:rPr lang="en-US" dirty="0"/>
               <a:t>)</a:t>
             </a:r>
           </a:p>
           <a:p>
             <a:r>
-              <a:rPr lang="en-US" dirty="0" err="1" smtClean="0"/>
+              <a:rPr lang="en-US" dirty="0" err="1"/>
               <a:t>Posibilitatea</a:t>
             </a:r>
             <a:r>
-              <a:rPr lang="en-US" dirty="0" smtClean="0"/>
+              <a:rPr lang="en-US" dirty="0"/>
+              <a:t> de a </a:t>
+            </a:r>
+            <a:r>
+              <a:rPr lang="en-US" dirty="0" err="1"/>
+              <a:t>juca</a:t>
+            </a:r>
+            <a:r>
+              <a:rPr lang="en-US" dirty="0"/>
               <a:t> </a:t>
             </a:r>
             <a:r>
-              <a:rPr lang="en-US" smtClean="0"/>
-              <a:t>de a juca</a:t>
-            </a:r>
-            <a:r>
-              <a:rPr lang="en-US" dirty="0" smtClean="0"/>
+              <a:rPr lang="ro-RO" dirty="0" err="1"/>
+              <a:t>î</a:t>
+            </a:r>
+            <a:r>
+              <a:rPr lang="en-US" dirty="0" err="1"/>
+              <a:t>mpotriva</a:t>
+            </a:r>
+            <a:r>
+              <a:rPr lang="en-US" dirty="0"/>
               <a:t> </a:t>
             </a:r>
             <a:r>
-              <a:rPr lang="en-US" dirty="0" err="1" smtClean="0"/>
-              <a:t>impotriva</a:t>
-            </a:r>
-            <a:r>
-              <a:rPr lang="en-US" dirty="0" smtClean="0"/>
+              <a:rPr lang="en-US" dirty="0" err="1"/>
+              <a:t>calculatorului</a:t>
+            </a:r>
+            <a:endParaRPr lang="en-US" dirty="0"/>
+          </a:p>
+          <a:p>
+            <a:r>
+              <a:rPr lang="en-US" dirty="0"/>
+              <a:t>Module de </a:t>
+            </a:r>
+            <a:r>
+              <a:rPr lang="en-US" dirty="0" err="1"/>
+              <a:t>antrenament</a:t>
+            </a:r>
+            <a:r>
+              <a:rPr lang="en-US" dirty="0"/>
+              <a:t>/</a:t>
+            </a:r>
+            <a:r>
+              <a:rPr lang="en-US" dirty="0" err="1"/>
+              <a:t>mutari</a:t>
+            </a:r>
+            <a:r>
+              <a:rPr lang="en-US" dirty="0"/>
               <a:t> </a:t>
             </a:r>
             <a:r>
-              <a:rPr lang="en-US" dirty="0" err="1" smtClean="0"/>
-              <a:t>calculatorului</a:t>
-            </a:r>
-            <a:endParaRPr lang="en-US" dirty="0" smtClean="0"/>
-          </a:p>
-          <a:p>
-            <a:r>
-              <a:rPr lang="en-US" dirty="0" smtClean="0"/>
-              <a:t>Module de </a:t>
-            </a:r>
-            <a:r>
-              <a:rPr lang="en-US" dirty="0" err="1" smtClean="0"/>
-              <a:t>antrenament</a:t>
-            </a:r>
-            <a:r>
-              <a:rPr lang="en-US" dirty="0" smtClean="0"/>
-              <a:t>/</a:t>
-            </a:r>
-            <a:r>
-              <a:rPr lang="en-US" dirty="0" err="1" smtClean="0"/>
-              <a:t>mutari</a:t>
-            </a:r>
-            <a:r>
-              <a:rPr lang="en-US" dirty="0" smtClean="0"/>
-              <a:t> </a:t>
-            </a:r>
-            <a:r>
-              <a:rPr lang="en-US" dirty="0" err="1" smtClean="0"/>
+              <a:rPr lang="en-US" dirty="0" err="1"/>
               <a:t>sugerate</a:t>
             </a:r>
             <a:endParaRPr lang="ro-RO" dirty="0"/>
@@ -6358,13 +6615,104 @@
   <p:clrMapOvr>
     <a:masterClrMapping/>
   </p:clrMapOvr>
-  <p:timing>
-    <p:tnLst>
-      <p:par>
-        <p:cTn id="1" dur="indefinite" restart="never" nodeType="tmRoot"/>
-      </p:par>
-    </p:tnLst>
-  </p:timing>
+</p:sld>
+</file>
+
+<file path=ppt/slides/slide15.xml><?xml version="1.0" encoding="utf-8"?>
+<p:sld xmlns:a="http://schemas.openxmlformats.org/drawingml/2006/main" xmlns:r="http://schemas.openxmlformats.org/officeDocument/2006/relationships" xmlns:p="http://schemas.openxmlformats.org/presentationml/2006/main">
+  <p:cSld>
+    <p:spTree>
+      <p:nvGrpSpPr>
+        <p:cNvPr id="1" name=""/>
+        <p:cNvGrpSpPr/>
+        <p:nvPr/>
+      </p:nvGrpSpPr>
+      <p:grpSpPr>
+        <a:xfrm>
+          <a:off x="0" y="0"/>
+          <a:ext cx="0" cy="0"/>
+          <a:chOff x="0" y="0"/>
+          <a:chExt cx="0" cy="0"/>
+        </a:xfrm>
+      </p:grpSpPr>
+      <p:sp>
+        <p:nvSpPr>
+          <p:cNvPr id="2" name="Title 1">
+            <a:extLst>
+              <a:ext uri="{FF2B5EF4-FFF2-40B4-BE49-F238E27FC236}">
+                <a16:creationId xmlns:a16="http://schemas.microsoft.com/office/drawing/2014/main" id="{94097990-C4CF-433F-AA22-B633440B235E}"/>
+              </a:ext>
+            </a:extLst>
+          </p:cNvPr>
+          <p:cNvSpPr>
+            <a:spLocks noGrp="1"/>
+          </p:cNvSpPr>
+          <p:nvPr>
+            <p:ph type="title"/>
+          </p:nvPr>
+        </p:nvSpPr>
+        <p:spPr>
+          <a:xfrm>
+            <a:off x="1524000" y="274638"/>
+            <a:ext cx="7162800" cy="868362"/>
+          </a:xfrm>
+        </p:spPr>
+        <p:txBody>
+          <a:bodyPr/>
+          <a:lstStyle/>
+          <a:p>
+            <a:r>
+              <a:rPr lang="en-US" dirty="0"/>
+              <a:t>Q&amp;A !</a:t>
+            </a:r>
+          </a:p>
+        </p:txBody>
+      </p:sp>
+      <p:pic>
+        <p:nvPicPr>
+          <p:cNvPr id="5" name="Content Placeholder 4">
+            <a:extLst>
+              <a:ext uri="{FF2B5EF4-FFF2-40B4-BE49-F238E27FC236}">
+                <a16:creationId xmlns:a16="http://schemas.microsoft.com/office/drawing/2014/main" id="{7F3CC0DA-7729-4BCB-9724-41944619F9D3}"/>
+              </a:ext>
+            </a:extLst>
+          </p:cNvPr>
+          <p:cNvPicPr>
+            <a:picLocks noGrp="1" noChangeAspect="1"/>
+          </p:cNvPicPr>
+          <p:nvPr>
+            <p:ph idx="1"/>
+          </p:nvPr>
+        </p:nvPicPr>
+        <p:blipFill>
+          <a:blip r:embed="rId2">
+            <a:extLst>
+              <a:ext uri="{28A0092B-C50C-407E-A947-70E740481C1C}">
+                <a14:useLocalDpi xmlns:a14="http://schemas.microsoft.com/office/drawing/2010/main" val="0"/>
+              </a:ext>
+            </a:extLst>
+          </a:blip>
+          <a:stretch>
+            <a:fillRect/>
+          </a:stretch>
+        </p:blipFill>
+        <p:spPr>
+          <a:xfrm>
+            <a:off x="1676400" y="1752600"/>
+            <a:ext cx="6705600" cy="5035479"/>
+          </a:xfrm>
+        </p:spPr>
+      </p:pic>
+    </p:spTree>
+    <p:extLst>
+      <p:ext uri="{BB962C8B-B14F-4D97-AF65-F5344CB8AC3E}">
+        <p14:creationId xmlns:p14="http://schemas.microsoft.com/office/powerpoint/2010/main" val="2572875777"/>
+      </p:ext>
+    </p:extLst>
+  </p:cSld>
+  <p:clrMapOvr>
+    <a:masterClrMapping/>
+  </p:clrMapOvr>
 </p:sld>
 </file>
 
@@ -6401,7 +6749,7 @@
           <a:lstStyle/>
           <a:p>
             <a:r>
-              <a:rPr lang="en-US" dirty="0" err="1" smtClean="0"/>
+              <a:rPr lang="en-US" dirty="0" err="1"/>
               <a:t>Cuprins</a:t>
             </a:r>
             <a:endParaRPr lang="ro-RO" dirty="0"/>
@@ -6426,65 +6774,53 @@
           <a:lstStyle/>
           <a:p>
             <a:r>
-              <a:rPr lang="ro-RO" dirty="0" smtClean="0"/>
+              <a:rPr lang="ro-RO" dirty="0"/>
               <a:t>Introducere</a:t>
             </a:r>
           </a:p>
           <a:p>
             <a:r>
-              <a:rPr lang="ro-RO" dirty="0" smtClean="0"/>
+              <a:rPr lang="ro-RO" dirty="0"/>
               <a:t>Proiecte similare</a:t>
             </a:r>
           </a:p>
           <a:p>
             <a:r>
-              <a:rPr lang="ro-RO" dirty="0" smtClean="0"/>
+              <a:rPr lang="ro-RO" dirty="0"/>
               <a:t>Dificultăți</a:t>
             </a:r>
           </a:p>
           <a:p>
             <a:r>
-              <a:rPr lang="ro-RO" dirty="0" smtClean="0"/>
+              <a:rPr lang="ro-RO" dirty="0"/>
               <a:t>Etapele implementării</a:t>
             </a:r>
           </a:p>
           <a:p>
             <a:r>
               <a:rPr lang="ro-RO" dirty="0"/>
-              <a:t>Implementarea jocului de </a:t>
-            </a:r>
-            <a:r>
-              <a:rPr lang="ro-RO" dirty="0" smtClean="0"/>
-              <a:t>dame</a:t>
-            </a:r>
-            <a:endParaRPr lang="en-US" dirty="0" smtClean="0"/>
+              <a:t>Implementarea jocului de dame</a:t>
+            </a:r>
+            <a:endParaRPr lang="en-US" dirty="0"/>
           </a:p>
           <a:p>
             <a:r>
               <a:rPr lang="ro-RO" dirty="0"/>
-              <a:t>Realizarea interacțiunii </a:t>
-            </a:r>
-            <a:r>
-              <a:rPr lang="ro-RO" dirty="0" smtClean="0"/>
-              <a:t>om-calculator</a:t>
-            </a:r>
-            <a:endParaRPr lang="en-US" dirty="0" smtClean="0"/>
-          </a:p>
-          <a:p>
-            <a:r>
-              <a:rPr lang="ro-RO" dirty="0" smtClean="0"/>
+              <a:t>Realizarea interacțiunii om-calculator</a:t>
+            </a:r>
+            <a:endParaRPr lang="en-US" dirty="0"/>
+          </a:p>
+          <a:p>
+            <a:r>
+              <a:rPr lang="ro-RO" dirty="0"/>
               <a:t>Concluzii</a:t>
             </a:r>
-            <a:endParaRPr lang="en-US" dirty="0" smtClean="0"/>
-          </a:p>
-          <a:p>
-            <a:r>
-              <a:rPr lang="ro-RO" dirty="0" smtClean="0"/>
-              <a:t>Direcții </a:t>
-            </a:r>
-            <a:r>
-              <a:rPr lang="ro-RO" dirty="0" smtClean="0"/>
-              <a:t>de îmbunătățire</a:t>
+            <a:endParaRPr lang="en-US" dirty="0"/>
+          </a:p>
+          <a:p>
+            <a:r>
+              <a:rPr lang="ro-RO" dirty="0"/>
+              <a:t>Direcții de îmbunătățire</a:t>
             </a:r>
           </a:p>
           <a:p>
@@ -6502,13 +6838,6 @@
   <p:clrMapOvr>
     <a:masterClrMapping/>
   </p:clrMapOvr>
-  <p:timing>
-    <p:tnLst>
-      <p:par>
-        <p:cTn id="1" dur="indefinite" restart="never" nodeType="tmRoot"/>
-      </p:par>
-    </p:tnLst>
-  </p:timing>
 </p:sld>
 </file>
 
@@ -6573,7 +6902,7 @@
           <a:lstStyle/>
           <a:p>
             <a:r>
-              <a:rPr lang="en-US" dirty="0" err="1" smtClean="0"/>
+              <a:rPr lang="en-US" dirty="0" err="1"/>
               <a:t>Introducere</a:t>
             </a:r>
             <a:endParaRPr lang="ro-RO" dirty="0"/>
@@ -6603,16 +6932,12 @@
           <a:lstStyle/>
           <a:p>
             <a:r>
-              <a:rPr lang="en-US" sz="2800" dirty="0" smtClean="0"/>
+              <a:rPr lang="en-US" sz="2800" dirty="0"/>
               <a:t>R</a:t>
             </a:r>
             <a:r>
-              <a:rPr lang="ro-RO" sz="2800" dirty="0" smtClean="0"/>
-              <a:t>ealizarea </a:t>
-            </a:r>
-            <a:r>
               <a:rPr lang="ro-RO" sz="2800" dirty="0"/>
-              <a:t>unui </a:t>
+              <a:t>ealizarea unui </a:t>
             </a:r>
             <a:r>
               <a:rPr lang="ro-RO" sz="2800" b="1" dirty="0"/>
@@ -6630,93 +6955,92 @@
               <a:rPr lang="ro-RO" sz="2800" dirty="0"/>
               <a:t>) 3D </a:t>
             </a:r>
-            <a:endParaRPr lang="en-US" sz="2800" dirty="0" smtClean="0"/>
-          </a:p>
-          <a:p>
-            <a:r>
-              <a:rPr lang="en-US" sz="2800" dirty="0" err="1" smtClean="0"/>
-              <a:t>Jucatorii</a:t>
-            </a:r>
-            <a:r>
-              <a:rPr lang="en-US" sz="2800" dirty="0" smtClean="0"/>
+            <a:endParaRPr lang="en-US" sz="2800" dirty="0"/>
+          </a:p>
+          <a:p>
+            <a:r>
+              <a:rPr lang="en-US" sz="2800" dirty="0" err="1"/>
+              <a:t>Juc</a:t>
+            </a:r>
+            <a:r>
+              <a:rPr lang="ro-RO" sz="2800" dirty="0"/>
+              <a:t>ă</a:t>
+            </a:r>
+            <a:r>
+              <a:rPr lang="en-US" sz="2800" dirty="0" err="1"/>
+              <a:t>torii</a:t>
+            </a:r>
+            <a:r>
+              <a:rPr lang="en-US" sz="2800" dirty="0"/>
               <a:t> </a:t>
             </a:r>
             <a:r>
-              <a:rPr lang="en-US" sz="2800" dirty="0" err="1" smtClean="0"/>
-              <a:t>efectueaza</a:t>
-            </a:r>
-            <a:r>
-              <a:rPr lang="en-US" sz="2800" dirty="0" smtClean="0"/>
+              <a:rPr lang="en-US" sz="2800" dirty="0" err="1"/>
+              <a:t>efectueaz</a:t>
+            </a:r>
+            <a:r>
+              <a:rPr lang="ro-RO" sz="2800" dirty="0"/>
+              <a:t>ă</a:t>
+            </a:r>
+            <a:r>
+              <a:rPr lang="en-US" sz="2800" dirty="0"/>
               <a:t> </a:t>
             </a:r>
             <a:r>
-              <a:rPr lang="ro-RO" sz="2800" dirty="0" smtClean="0"/>
-              <a:t>mutările</a:t>
-            </a:r>
-            <a:r>
               <a:rPr lang="ro-RO" sz="2800" dirty="0"/>
-              <a:t>, pe rand, cu ajutorul unui controller Leap </a:t>
-            </a:r>
-            <a:r>
-              <a:rPr lang="ro-RO" sz="2800" dirty="0" smtClean="0"/>
-              <a:t>Motion </a:t>
-            </a:r>
-            <a:endParaRPr lang="en-US" sz="2800" dirty="0" smtClean="0"/>
-          </a:p>
-          <a:p>
-            <a:r>
-              <a:rPr lang="ro-RO" sz="2800" dirty="0" smtClean="0"/>
-              <a:t>Procesarea </a:t>
-            </a:r>
+              <a:t>mutările, pe rând, cu ajutorul unui controller Leap Motion </a:t>
+            </a:r>
+            <a:endParaRPr lang="en-US" sz="2800" dirty="0"/>
+          </a:p>
+          <a:p>
             <a:r>
               <a:rPr lang="ro-RO" sz="2800" dirty="0"/>
-              <a:t>datelor </a:t>
-            </a:r>
-            <a:r>
-              <a:rPr lang="en-US" sz="2800" dirty="0" smtClean="0"/>
+              <a:t>Procesarea datelor </a:t>
+            </a:r>
+            <a:r>
+              <a:rPr lang="en-US" sz="2800" dirty="0"/>
               <a:t>de la </a:t>
             </a:r>
             <a:r>
-              <a:rPr lang="ro-RO" sz="2800" dirty="0" smtClean="0"/>
-              <a:t>Leap </a:t>
-            </a:r>
-            <a:r>
               <a:rPr lang="ro-RO" sz="2800" dirty="0"/>
-              <a:t>Motion </a:t>
-            </a:r>
-            <a:r>
-              <a:rPr lang="en-US" sz="2800" dirty="0" err="1" smtClean="0"/>
+              <a:t>Leap Motion </a:t>
+            </a:r>
+            <a:r>
+              <a:rPr lang="en-US" sz="2800" dirty="0" err="1"/>
               <a:t>prin</a:t>
             </a:r>
             <a:r>
-              <a:rPr lang="en-US" sz="2800" dirty="0" smtClean="0"/>
+              <a:rPr lang="en-US" sz="2800" dirty="0"/>
               <a:t> </a:t>
             </a:r>
             <a:r>
-              <a:rPr lang="en-US" sz="2800" dirty="0" err="1" smtClean="0"/>
+              <a:rPr lang="en-US" sz="2800" dirty="0" err="1"/>
               <a:t>intermediul</a:t>
             </a:r>
             <a:r>
-              <a:rPr lang="ro-RO" sz="2800" dirty="0" smtClean="0"/>
+              <a:rPr lang="ro-RO" sz="2800" dirty="0"/>
               <a:t> Unity</a:t>
             </a:r>
             <a:r>
-              <a:rPr lang="en-US" sz="2800" dirty="0" smtClean="0"/>
+              <a:rPr lang="en-US" sz="2800" dirty="0"/>
               <a:t> </a:t>
             </a:r>
             <a:r>
-              <a:rPr lang="en-US" sz="2800" dirty="0" err="1" smtClean="0"/>
-              <a:t>si</a:t>
-            </a:r>
-            <a:r>
-              <a:rPr lang="en-US" sz="2800" dirty="0" smtClean="0"/>
+              <a:rPr lang="ro-RO" sz="2800" dirty="0" err="1"/>
+              <a:t>ș</a:t>
+            </a:r>
+            <a:r>
+              <a:rPr lang="en-US" sz="2800" dirty="0" err="1"/>
+              <a:t>i</a:t>
+            </a:r>
+            <a:r>
+              <a:rPr lang="en-US" sz="2800" dirty="0"/>
               <a:t> </a:t>
             </a:r>
             <a:r>
-              <a:rPr lang="ro-RO" sz="2800" dirty="0" smtClean="0"/>
+              <a:rPr lang="ro-RO" sz="2800" dirty="0"/>
               <a:t>C#</a:t>
             </a:r>
-            <a:endParaRPr lang="ro-RO" sz="2800" dirty="0"/>
           </a:p>
         </p:txBody>
       </p:sp>
@@ -6730,13 +7054,6 @@
   <p:clrMapOvr>
     <a:masterClrMapping/>
   </p:clrMapOvr>
-  <p:timing>
-    <p:tnLst>
-      <p:par>
-        <p:cTn id="1" dur="indefinite" restart="never" nodeType="tmRoot"/>
-      </p:par>
-    </p:tnLst>
-  </p:timing>
 </p:sld>
 </file>
 
@@ -6773,8 +7090,16 @@
           <a:lstStyle/>
           <a:p>
             <a:r>
-              <a:rPr lang="en-US" dirty="0" err="1" smtClean="0"/>
-              <a:t>Motivatie</a:t>
+              <a:rPr lang="en-US" dirty="0"/>
+              <a:t>Motiva</a:t>
+            </a:r>
+            <a:r>
+              <a:rPr lang="ro-RO" dirty="0"/>
+              <a:t>ț</a:t>
+            </a:r>
+            <a:r>
+              <a:rPr lang="en-US" dirty="0" err="1"/>
+              <a:t>ie</a:t>
             </a:r>
             <a:endParaRPr lang="ro-RO" dirty="0"/>
           </a:p>
@@ -6803,129 +7128,141 @@
           <a:lstStyle/>
           <a:p>
             <a:r>
-              <a:rPr lang="en-US" sz="2800" dirty="0" err="1" smtClean="0"/>
+              <a:rPr lang="en-US" sz="2800" dirty="0" err="1"/>
               <a:t>Joc</a:t>
             </a:r>
             <a:r>
-              <a:rPr lang="en-US" sz="2800" dirty="0" smtClean="0"/>
+              <a:rPr lang="en-US" sz="2800" dirty="0"/>
               <a:t> de </a:t>
             </a:r>
             <a:r>
-              <a:rPr lang="en-US" sz="2800" dirty="0" err="1" smtClean="0"/>
+              <a:rPr lang="en-US" sz="2800" dirty="0" err="1"/>
               <a:t>strategie</a:t>
             </a:r>
             <a:r>
-              <a:rPr lang="en-US" sz="2800" dirty="0" smtClean="0"/>
+              <a:rPr lang="en-US" sz="2800" dirty="0"/>
               <a:t> multiplayer </a:t>
             </a:r>
             <a:r>
-              <a:rPr lang="en-US" sz="2800" dirty="0" err="1" smtClean="0"/>
+              <a:rPr lang="en-US" sz="2800" dirty="0" err="1"/>
               <a:t>interactiv</a:t>
             </a:r>
-            <a:endParaRPr lang="en-US" sz="2800" dirty="0" smtClean="0"/>
-          </a:p>
-          <a:p>
-            <a:r>
-              <a:rPr lang="en-US" sz="2800" dirty="0" smtClean="0"/>
+            <a:endParaRPr lang="en-US" sz="2800" dirty="0"/>
+          </a:p>
+          <a:p>
+            <a:r>
+              <a:rPr lang="en-US" sz="2800" dirty="0"/>
               <a:t>Se </a:t>
             </a:r>
             <a:r>
-              <a:rPr lang="en-US" sz="2800" dirty="0" err="1" smtClean="0"/>
+              <a:rPr lang="en-US" sz="2800" dirty="0" err="1"/>
               <a:t>poate</a:t>
             </a:r>
             <a:r>
-              <a:rPr lang="en-US" sz="2800" dirty="0" smtClean="0"/>
+              <a:rPr lang="en-US" sz="2800" dirty="0"/>
               <a:t> </a:t>
             </a:r>
             <a:r>
-              <a:rPr lang="en-US" sz="2800" dirty="0" err="1" smtClean="0"/>
+              <a:rPr lang="en-US" sz="2800" dirty="0" err="1"/>
               <a:t>adresa</a:t>
             </a:r>
             <a:r>
-              <a:rPr lang="en-US" sz="2800" dirty="0" smtClean="0"/>
+              <a:rPr lang="en-US" sz="2800" dirty="0"/>
               <a:t> </a:t>
             </a:r>
             <a:r>
-              <a:rPr lang="en-US" sz="2800" dirty="0" err="1" smtClean="0"/>
+              <a:rPr lang="en-US" sz="2800" dirty="0" err="1"/>
               <a:t>persoanelor</a:t>
             </a:r>
             <a:r>
-              <a:rPr lang="en-US" sz="2800" dirty="0" smtClean="0"/>
+              <a:rPr lang="en-US" sz="2800" dirty="0"/>
               <a:t> cu </a:t>
             </a:r>
             <a:r>
-              <a:rPr lang="en-US" sz="2800" dirty="0" err="1" smtClean="0"/>
-              <a:t>deficiente</a:t>
-            </a:r>
-            <a:r>
-              <a:rPr lang="en-US" sz="2800" dirty="0" smtClean="0"/>
+              <a:rPr lang="en-US" sz="2800" dirty="0" err="1"/>
+              <a:t>deficien</a:t>
+            </a:r>
+            <a:r>
+              <a:rPr lang="ro-RO" sz="2800" dirty="0"/>
+              <a:t>ț</a:t>
+            </a:r>
+            <a:r>
+              <a:rPr lang="en-US" sz="2800" dirty="0"/>
+              <a:t>e </a:t>
+            </a:r>
+            <a:r>
+              <a:rPr lang="en-US" sz="2800" dirty="0" err="1"/>
+              <a:t>motorii</a:t>
+            </a:r>
+            <a:r>
+              <a:rPr lang="en-US" sz="2800" dirty="0"/>
+              <a:t> la </a:t>
+            </a:r>
+            <a:r>
+              <a:rPr lang="en-US" sz="2800" dirty="0" err="1"/>
+              <a:t>nivelul</a:t>
+            </a:r>
+            <a:r>
+              <a:rPr lang="en-US" sz="2800" dirty="0"/>
               <a:t> </a:t>
             </a:r>
             <a:r>
-              <a:rPr lang="en-US" sz="2800" dirty="0" err="1" smtClean="0"/>
-              <a:t>motorii</a:t>
-            </a:r>
-            <a:r>
-              <a:rPr lang="en-US" sz="2800" dirty="0" smtClean="0"/>
-              <a:t> la </a:t>
-            </a:r>
-            <a:r>
-              <a:rPr lang="en-US" sz="2800" dirty="0" err="1" smtClean="0"/>
-              <a:t>nivelul</a:t>
-            </a:r>
-            <a:r>
-              <a:rPr lang="en-US" sz="2800" dirty="0" smtClean="0"/>
+              <a:rPr lang="en-US" sz="2800" dirty="0" err="1"/>
+              <a:t>membrelor</a:t>
+            </a:r>
+            <a:r>
+              <a:rPr lang="en-US" sz="2800" dirty="0"/>
               <a:t> </a:t>
             </a:r>
             <a:r>
-              <a:rPr lang="en-US" sz="2800" dirty="0" err="1" smtClean="0"/>
-              <a:t>membrelor</a:t>
-            </a:r>
-            <a:r>
-              <a:rPr lang="en-US" sz="2800" dirty="0" smtClean="0"/>
+              <a:rPr lang="en-US" sz="2800" dirty="0" err="1"/>
+              <a:t>superioare</a:t>
+            </a:r>
+            <a:endParaRPr lang="en-US" sz="2800" dirty="0"/>
+          </a:p>
+          <a:p>
+            <a:r>
+              <a:rPr lang="en-US" sz="2800" dirty="0" err="1"/>
+              <a:t>Filtrarea</a:t>
+            </a:r>
+            <a:r>
+              <a:rPr lang="en-US" sz="2800" dirty="0"/>
+              <a:t> mi</a:t>
+            </a:r>
+            <a:r>
+              <a:rPr lang="ro-RO" sz="2800" dirty="0"/>
+              <a:t>ș</a:t>
+            </a:r>
+            <a:r>
+              <a:rPr lang="en-US" sz="2800" dirty="0" err="1"/>
+              <a:t>carii</a:t>
+            </a:r>
+            <a:r>
+              <a:rPr lang="en-US" sz="2800" dirty="0"/>
               <a:t> </a:t>
             </a:r>
             <a:r>
-              <a:rPr lang="en-US" sz="2800" dirty="0" err="1" smtClean="0"/>
-              <a:t>superioare</a:t>
-            </a:r>
-            <a:endParaRPr lang="en-US" sz="2800" dirty="0" smtClean="0"/>
-          </a:p>
-          <a:p>
+              <a:rPr lang="ro-RO" sz="2800" dirty="0"/>
+              <a:t>î</a:t>
+            </a:r>
+            <a:r>
+              <a:rPr lang="en-US" sz="2800" dirty="0"/>
+              <a:t>n </a:t>
+            </a:r>
             <a:r>
               <a:rPr lang="en-US" sz="2800" dirty="0" err="1"/>
-              <a:t>F</a:t>
-            </a:r>
-            <a:r>
-              <a:rPr lang="en-US" sz="2800" dirty="0" err="1" smtClean="0"/>
-              <a:t>iltrarea</a:t>
-            </a:r>
-            <a:r>
-              <a:rPr lang="en-US" sz="2800" dirty="0" smtClean="0"/>
+              <a:t>cazul</a:t>
+            </a:r>
+            <a:r>
+              <a:rPr lang="en-US" sz="2800" dirty="0"/>
               <a:t> </a:t>
             </a:r>
             <a:r>
-              <a:rPr lang="en-US" sz="2800" dirty="0" err="1" smtClean="0"/>
-              <a:t>miscarii</a:t>
-            </a:r>
-            <a:r>
-              <a:rPr lang="en-US" sz="2800" dirty="0" smtClean="0"/>
-              <a:t> in </a:t>
-            </a:r>
-            <a:r>
-              <a:rPr lang="en-US" sz="2800" dirty="0" err="1" smtClean="0"/>
-              <a:t>cazul</a:t>
-            </a:r>
-            <a:r>
-              <a:rPr lang="en-US" sz="2800" dirty="0" smtClean="0"/>
-              <a:t> </a:t>
-            </a:r>
-            <a:r>
-              <a:rPr lang="en-US" sz="2800" dirty="0" err="1" smtClean="0"/>
+              <a:rPr lang="en-US" sz="2800" dirty="0" err="1"/>
               <a:t>bolii</a:t>
             </a:r>
             <a:r>
-              <a:rPr lang="en-US" sz="2800" dirty="0" smtClean="0"/>
+              <a:rPr lang="en-US" sz="2800" dirty="0"/>
               <a:t> Parkinson</a:t>
             </a:r>
             <a:endParaRPr lang="ro-RO" sz="2800" dirty="0"/>
@@ -7047,13 +7384,6 @@
   <p:clrMapOvr>
     <a:masterClrMapping/>
   </p:clrMapOvr>
-  <p:timing>
-    <p:tnLst>
-      <p:par>
-        <p:cTn id="1" dur="indefinite" restart="never" nodeType="tmRoot"/>
-      </p:par>
-    </p:tnLst>
-  </p:timing>
 </p:sld>
 </file>
 
@@ -7090,10 +7420,9 @@
           <a:lstStyle/>
           <a:p>
             <a:r>
-              <a:rPr lang="ro-RO" dirty="0" smtClean="0"/>
+              <a:rPr lang="ro-RO" dirty="0"/>
               <a:t>Proiecte similare</a:t>
             </a:r>
-            <a:endParaRPr lang="ro-RO" dirty="0"/>
           </a:p>
         </p:txBody>
       </p:sp>
@@ -7113,19 +7442,19 @@
           <a:lstStyle/>
           <a:p>
             <a:r>
-              <a:rPr lang="en-US" dirty="0" smtClean="0"/>
+              <a:rPr lang="en-US" dirty="0"/>
               <a:t>Gesture Based Checkers Master</a:t>
             </a:r>
           </a:p>
           <a:p>
             <a:r>
-              <a:rPr lang="en-US" dirty="0" smtClean="0"/>
+              <a:rPr lang="en-US" dirty="0"/>
               <a:t>Robot Chess</a:t>
             </a:r>
           </a:p>
           <a:p>
             <a:r>
-              <a:rPr lang="en-US" dirty="0" smtClean="0"/>
+              <a:rPr lang="en-US" dirty="0"/>
               <a:t>Virtual Chess</a:t>
             </a:r>
             <a:endParaRPr lang="ro-RO" dirty="0"/>
@@ -7183,13 +7512,6 @@
   <p:clrMapOvr>
     <a:masterClrMapping/>
   </p:clrMapOvr>
-  <p:timing>
-    <p:tnLst>
-      <p:par>
-        <p:cTn id="1" dur="indefinite" restart="never" nodeType="tmRoot"/>
-      </p:par>
-    </p:tnLst>
-  </p:timing>
 </p:sld>
 </file>
 
@@ -7226,10 +7548,9 @@
           <a:lstStyle/>
           <a:p>
             <a:r>
-              <a:rPr lang="ro-RO" dirty="0" smtClean="0"/>
+              <a:rPr lang="ro-RO" dirty="0"/>
               <a:t>Dificultăți</a:t>
             </a:r>
-            <a:endParaRPr lang="ro-RO" dirty="0"/>
           </a:p>
         </p:txBody>
       </p:sp>
@@ -7249,134 +7570,194 @@
           <a:lstStyle/>
           <a:p>
             <a:r>
-              <a:rPr lang="en-US" dirty="0" err="1" smtClean="0"/>
+              <a:rPr lang="en-US" dirty="0" err="1"/>
               <a:t>Detectarea</a:t>
             </a:r>
             <a:r>
-              <a:rPr lang="en-US" dirty="0" smtClean="0"/>
+              <a:rPr lang="en-US" dirty="0"/>
               <a:t> </a:t>
             </a:r>
             <a:r>
-              <a:rPr lang="en-US" dirty="0" err="1" smtClean="0"/>
+              <a:rPr lang="en-US" dirty="0" err="1"/>
               <a:t>piesei</a:t>
             </a:r>
             <a:r>
-              <a:rPr lang="en-US" dirty="0" smtClean="0"/>
+              <a:rPr lang="en-US" dirty="0"/>
               <a:t> care se </a:t>
             </a:r>
             <a:r>
-              <a:rPr lang="en-US" dirty="0" err="1" smtClean="0"/>
-              <a:t>doreste</a:t>
-            </a:r>
-            <a:r>
-              <a:rPr lang="en-US" dirty="0" smtClean="0"/>
+              <a:rPr lang="en-US" dirty="0" err="1"/>
+              <a:t>dore</a:t>
+            </a:r>
+            <a:r>
+              <a:rPr lang="ro-RO" dirty="0"/>
+              <a:t>ș</a:t>
+            </a:r>
+            <a:r>
+              <a:rPr lang="en-US" dirty="0" err="1"/>
+              <a:t>te</a:t>
+            </a:r>
+            <a:r>
+              <a:rPr lang="en-US" dirty="0"/>
               <a:t> a fi </a:t>
             </a:r>
             <a:r>
-              <a:rPr lang="en-US" dirty="0" err="1" smtClean="0"/>
-              <a:t>mutata</a:t>
-            </a:r>
-            <a:r>
-              <a:rPr lang="en-US" dirty="0" smtClean="0"/>
+              <a:rPr lang="en-US" dirty="0" err="1"/>
+              <a:t>mutat</a:t>
+            </a:r>
+            <a:r>
+              <a:rPr lang="ro-RO" dirty="0"/>
+              <a:t>ă</a:t>
+            </a:r>
+            <a:r>
+              <a:rPr lang="en-US" dirty="0"/>
               <a:t> cu Leap Motion</a:t>
             </a:r>
           </a:p>
           <a:p>
             <a:r>
-              <a:rPr lang="en-US" dirty="0" err="1" smtClean="0"/>
-              <a:t>Pozitia</a:t>
-            </a:r>
-            <a:r>
-              <a:rPr lang="en-US" dirty="0" smtClean="0"/>
+              <a:rPr lang="en-US" dirty="0" err="1"/>
+              <a:t>Pozi</a:t>
+            </a:r>
+            <a:r>
+              <a:rPr lang="ro-RO" dirty="0"/>
+              <a:t>ț</a:t>
+            </a:r>
+            <a:r>
+              <a:rPr lang="en-US" dirty="0" err="1"/>
+              <a:t>ia</a:t>
+            </a:r>
+            <a:r>
+              <a:rPr lang="en-US" dirty="0"/>
+              <a:t> v</a:t>
+            </a:r>
+            <a:r>
+              <a:rPr lang="ro-RO" dirty="0"/>
+              <a:t>â</a:t>
+            </a:r>
+            <a:r>
+              <a:rPr lang="en-US" dirty="0" err="1"/>
+              <a:t>rfului</a:t>
+            </a:r>
+            <a:r>
+              <a:rPr lang="en-US" dirty="0"/>
               <a:t> </a:t>
             </a:r>
             <a:r>
-              <a:rPr lang="en-US" dirty="0" err="1" smtClean="0"/>
-              <a:t>varfului</a:t>
-            </a:r>
-            <a:r>
-              <a:rPr lang="en-US" dirty="0" smtClean="0"/>
+              <a:rPr lang="en-US" dirty="0" err="1"/>
+              <a:t>degetului</a:t>
+            </a:r>
+            <a:r>
+              <a:rPr lang="en-US" dirty="0"/>
               <a:t> </a:t>
             </a:r>
             <a:r>
-              <a:rPr lang="en-US" dirty="0" err="1" smtClean="0"/>
-              <a:t>degetului</a:t>
-            </a:r>
-            <a:r>
-              <a:rPr lang="en-US" dirty="0" smtClean="0"/>
-              <a:t> in </a:t>
-            </a:r>
-            <a:r>
-              <a:rPr lang="en-US" dirty="0" err="1" smtClean="0"/>
-              <a:t>spatiul</a:t>
-            </a:r>
-            <a:r>
-              <a:rPr lang="en-US" dirty="0" smtClean="0"/>
+              <a:rPr lang="ro-RO" dirty="0"/>
+              <a:t>î</a:t>
+            </a:r>
+            <a:r>
+              <a:rPr lang="en-US" dirty="0"/>
+              <a:t>n spa</a:t>
+            </a:r>
+            <a:r>
+              <a:rPr lang="ro-RO" dirty="0"/>
+              <a:t>ț</a:t>
+            </a:r>
+            <a:r>
+              <a:rPr lang="en-US" dirty="0" err="1"/>
+              <a:t>iul</a:t>
+            </a:r>
+            <a:r>
+              <a:rPr lang="en-US" dirty="0"/>
               <a:t> de </a:t>
             </a:r>
             <a:r>
-              <a:rPr lang="en-US" dirty="0" err="1" smtClean="0"/>
+              <a:rPr lang="en-US" dirty="0" err="1"/>
               <a:t>joc</a:t>
             </a:r>
-            <a:endParaRPr lang="en-US" dirty="0" smtClean="0"/>
-          </a:p>
-          <a:p>
-            <a:r>
-              <a:rPr lang="en-US" dirty="0" err="1" smtClean="0"/>
-              <a:t>Inceputul</a:t>
-            </a:r>
-            <a:r>
-              <a:rPr lang="en-US" dirty="0" smtClean="0"/>
+            <a:endParaRPr lang="en-US" dirty="0"/>
+          </a:p>
+          <a:p>
+            <a:r>
+              <a:rPr lang="ro-RO" dirty="0" err="1"/>
+              <a:t>Î</a:t>
+            </a:r>
+            <a:r>
+              <a:rPr lang="en-US" dirty="0" err="1"/>
+              <a:t>nceputul</a:t>
+            </a:r>
+            <a:r>
+              <a:rPr lang="en-US" dirty="0"/>
+              <a:t> m</a:t>
+            </a:r>
+            <a:r>
+              <a:rPr lang="ro-RO" dirty="0"/>
+              <a:t>iș</a:t>
+            </a:r>
+            <a:r>
+              <a:rPr lang="en-US" dirty="0"/>
+              <a:t>c</a:t>
+            </a:r>
+            <a:r>
+              <a:rPr lang="ro-RO" dirty="0"/>
+              <a:t>ă</a:t>
+            </a:r>
+            <a:r>
+              <a:rPr lang="en-US" dirty="0" err="1"/>
+              <a:t>rii</a:t>
+            </a:r>
+            <a:endParaRPr lang="en-US" dirty="0"/>
+          </a:p>
+          <a:p>
+            <a:r>
+              <a:rPr lang="en-US" dirty="0" err="1"/>
+              <a:t>Finalizarea</a:t>
+            </a:r>
+            <a:r>
+              <a:rPr lang="en-US" dirty="0"/>
               <a:t> </a:t>
             </a:r>
             <a:r>
-              <a:rPr lang="en-US" dirty="0" err="1" smtClean="0"/>
-              <a:t>miscarii</a:t>
-            </a:r>
-            <a:endParaRPr lang="en-US" dirty="0" smtClean="0"/>
-          </a:p>
-          <a:p>
-            <a:r>
-              <a:rPr lang="en-US" dirty="0" err="1" smtClean="0"/>
-              <a:t>Finalizarea</a:t>
-            </a:r>
-            <a:r>
-              <a:rPr lang="en-US" dirty="0" smtClean="0"/>
+              <a:rPr lang="en-US" dirty="0" err="1"/>
+              <a:t>mut</a:t>
+            </a:r>
+            <a:r>
+              <a:rPr lang="ro-RO" dirty="0"/>
+              <a:t>ă</a:t>
+            </a:r>
+            <a:r>
+              <a:rPr lang="en-US" dirty="0" err="1"/>
+              <a:t>rii</a:t>
+            </a:r>
+            <a:endParaRPr lang="en-US" dirty="0"/>
+          </a:p>
+          <a:p>
+            <a:r>
+              <a:rPr lang="en-US" dirty="0" err="1"/>
+              <a:t>Identificarea</a:t>
+            </a:r>
+            <a:r>
+              <a:rPr lang="en-US" dirty="0"/>
               <a:t> </a:t>
             </a:r>
             <a:r>
-              <a:rPr lang="en-US" dirty="0" err="1" smtClean="0"/>
-              <a:t>mutarii</a:t>
-            </a:r>
-            <a:endParaRPr lang="en-US" dirty="0" smtClean="0"/>
-          </a:p>
-          <a:p>
-            <a:r>
-              <a:rPr lang="en-US" dirty="0" err="1" smtClean="0"/>
-              <a:t>Identificarea</a:t>
-            </a:r>
-            <a:r>
-              <a:rPr lang="en-US" dirty="0" smtClean="0"/>
-              <a:t> </a:t>
-            </a:r>
-            <a:r>
-              <a:rPr lang="en-US" dirty="0" err="1" smtClean="0"/>
+              <a:rPr lang="en-US" dirty="0" err="1"/>
               <a:t>unui</a:t>
             </a:r>
             <a:r>
-              <a:rPr lang="en-US" dirty="0" smtClean="0"/>
+              <a:rPr lang="en-US" dirty="0"/>
               <a:t> set de </a:t>
             </a:r>
             <a:r>
-              <a:rPr lang="en-US" dirty="0" err="1" smtClean="0"/>
+              <a:rPr lang="en-US" dirty="0" err="1"/>
               <a:t>reguli</a:t>
             </a:r>
             <a:r>
-              <a:rPr lang="en-US" dirty="0" smtClean="0"/>
+              <a:rPr lang="en-US" dirty="0"/>
               <a:t> general </a:t>
             </a:r>
             <a:r>
-              <a:rPr lang="en-US" dirty="0" err="1" smtClean="0"/>
+              <a:rPr lang="en-US" dirty="0" err="1"/>
               <a:t>valabil</a:t>
             </a:r>
             <a:endParaRPr lang="ro-RO" dirty="0"/>
@@ -7393,13 +7774,6 @@
   <p:clrMapOvr>
     <a:masterClrMapping/>
   </p:clrMapOvr>
-  <p:timing>
-    <p:tnLst>
-      <p:par>
-        <p:cTn id="1" dur="indefinite" restart="never" nodeType="tmRoot"/>
-      </p:par>
-    </p:tnLst>
-  </p:timing>
 </p:sld>
 </file>
 
@@ -7436,19 +7810,19 @@
           <a:lstStyle/>
           <a:p>
             <a:r>
-              <a:rPr lang="en-US" dirty="0" err="1" smtClean="0"/>
+              <a:rPr lang="en-US" dirty="0" err="1"/>
               <a:t>Etapele</a:t>
             </a:r>
             <a:r>
-              <a:rPr lang="en-US" dirty="0" smtClean="0"/>
+              <a:rPr lang="en-US" dirty="0"/>
               <a:t> implement</a:t>
             </a:r>
             <a:r>
-              <a:rPr lang="ro-RO" dirty="0" smtClean="0"/>
+              <a:rPr lang="ro-RO" dirty="0"/>
               <a:t>ă</a:t>
             </a:r>
             <a:r>
-              <a:rPr lang="en-US" dirty="0" err="1" smtClean="0"/>
+              <a:rPr lang="en-US" dirty="0" err="1"/>
               <a:t>rii</a:t>
             </a:r>
             <a:endParaRPr lang="ro-RO" dirty="0"/>
@@ -7476,121 +7850,133 @@
           <a:lstStyle/>
           <a:p>
             <a:r>
-              <a:rPr lang="en-US" dirty="0" err="1" smtClean="0"/>
+              <a:rPr lang="en-US" dirty="0" err="1"/>
               <a:t>Alegerea</a:t>
             </a:r>
             <a:r>
-              <a:rPr lang="en-US" dirty="0" smtClean="0"/>
+              <a:rPr lang="en-US" dirty="0"/>
               <a:t> </a:t>
             </a:r>
             <a:r>
-              <a:rPr lang="en-US" dirty="0" err="1" smtClean="0"/>
+              <a:rPr lang="en-US" dirty="0" err="1"/>
               <a:t>temei</a:t>
             </a:r>
-            <a:endParaRPr lang="en-US" dirty="0" smtClean="0"/>
-          </a:p>
-          <a:p>
-            <a:r>
-              <a:rPr lang="en-US" dirty="0" err="1" smtClean="0"/>
+            <a:endParaRPr lang="en-US" dirty="0"/>
+          </a:p>
+          <a:p>
+            <a:r>
+              <a:rPr lang="en-US" dirty="0" err="1"/>
               <a:t>Identificarea</a:t>
             </a:r>
             <a:r>
-              <a:rPr lang="en-US" dirty="0" smtClean="0"/>
+              <a:rPr lang="en-US" dirty="0"/>
               <a:t> </a:t>
             </a:r>
             <a:r>
-              <a:rPr lang="en-US" dirty="0" err="1" smtClean="0"/>
+              <a:rPr lang="en-US" dirty="0" err="1"/>
               <a:t>tipului</a:t>
             </a:r>
             <a:r>
-              <a:rPr lang="en-US" dirty="0" smtClean="0"/>
+              <a:rPr lang="en-US" dirty="0"/>
               <a:t> de </a:t>
             </a:r>
             <a:r>
-              <a:rPr lang="en-US" dirty="0" err="1" smtClean="0"/>
+              <a:rPr lang="en-US" dirty="0" err="1"/>
               <a:t>dispozitiv</a:t>
             </a:r>
             <a:r>
-              <a:rPr lang="en-US" dirty="0" smtClean="0"/>
+              <a:rPr lang="en-US" dirty="0"/>
               <a:t> </a:t>
             </a:r>
             <a:r>
-              <a:rPr lang="en-US" dirty="0" err="1" smtClean="0"/>
+              <a:rPr lang="en-US" dirty="0" err="1"/>
               <a:t>folosit</a:t>
             </a:r>
             <a:r>
-              <a:rPr lang="en-US" dirty="0" smtClean="0"/>
+              <a:rPr lang="en-US" dirty="0"/>
               <a:t> </a:t>
             </a:r>
             <a:r>
-              <a:rPr lang="en-US" dirty="0" err="1" smtClean="0"/>
+              <a:rPr lang="en-US" dirty="0" err="1"/>
               <a:t>pentru</a:t>
             </a:r>
             <a:r>
-              <a:rPr lang="en-US" dirty="0" smtClean="0"/>
+              <a:rPr lang="en-US" dirty="0"/>
               <a:t> </a:t>
             </a:r>
             <a:r>
-              <a:rPr lang="en-US" dirty="0" err="1" smtClean="0"/>
-              <a:t>intearctiune</a:t>
-            </a:r>
-            <a:endParaRPr lang="en-US" dirty="0" smtClean="0"/>
-          </a:p>
-          <a:p>
-            <a:r>
-              <a:rPr lang="en-US" dirty="0" err="1" smtClean="0"/>
+              <a:rPr lang="en-US" dirty="0" err="1"/>
+              <a:t>intearc</a:t>
+            </a:r>
+            <a:r>
+              <a:rPr lang="ro-RO" dirty="0"/>
+              <a:t>ț</a:t>
+            </a:r>
+            <a:r>
+              <a:rPr lang="en-US" dirty="0" err="1"/>
+              <a:t>iune</a:t>
+            </a:r>
+            <a:endParaRPr lang="en-US" dirty="0"/>
+          </a:p>
+          <a:p>
+            <a:r>
+              <a:rPr lang="en-US" dirty="0" err="1"/>
               <a:t>Instalare</a:t>
             </a:r>
             <a:r>
-              <a:rPr lang="en-US" dirty="0" smtClean="0"/>
+              <a:rPr lang="en-US" dirty="0"/>
               <a:t> </a:t>
             </a:r>
             <a:r>
-              <a:rPr lang="en-US" dirty="0" err="1" smtClean="0"/>
-              <a:t>si</a:t>
-            </a:r>
-            <a:r>
-              <a:rPr lang="en-US" dirty="0" smtClean="0"/>
+              <a:rPr lang="ro-RO" dirty="0" err="1"/>
+              <a:t>ș</a:t>
+            </a:r>
+            <a:r>
+              <a:rPr lang="en-US" dirty="0" err="1"/>
+              <a:t>i</a:t>
+            </a:r>
+            <a:r>
+              <a:rPr lang="en-US" dirty="0"/>
               <a:t> </a:t>
             </a:r>
             <a:r>
-              <a:rPr lang="en-US" dirty="0" err="1" smtClean="0"/>
+              <a:rPr lang="en-US" dirty="0" err="1"/>
               <a:t>testare</a:t>
             </a:r>
             <a:r>
-              <a:rPr lang="en-US" dirty="0" smtClean="0"/>
+              <a:rPr lang="en-US" dirty="0"/>
               <a:t> Unity</a:t>
             </a:r>
           </a:p>
           <a:p>
             <a:r>
-              <a:rPr lang="en-US" dirty="0" err="1" smtClean="0"/>
-              <a:t>Obtinere</a:t>
-            </a:r>
-            <a:r>
-              <a:rPr lang="en-US" dirty="0" smtClean="0"/>
+              <a:rPr lang="ro-RO" dirty="0"/>
+              <a:t>Achiziționare</a:t>
+            </a:r>
+            <a:r>
+              <a:rPr lang="en-US" dirty="0"/>
               <a:t> </a:t>
             </a:r>
             <a:r>
-              <a:rPr lang="en-US" dirty="0" err="1" smtClean="0"/>
+              <a:rPr lang="en-US" dirty="0" err="1"/>
               <a:t>dispozitiv</a:t>
             </a:r>
             <a:r>
-              <a:rPr lang="en-US" dirty="0" smtClean="0"/>
+              <a:rPr lang="en-US" dirty="0"/>
               <a:t> Leap Motion</a:t>
             </a:r>
           </a:p>
           <a:p>
             <a:r>
-              <a:rPr lang="en-US" dirty="0" err="1" smtClean="0"/>
+              <a:rPr lang="en-US" dirty="0" err="1"/>
               <a:t>Planificarea</a:t>
             </a:r>
             <a:r>
-              <a:rPr lang="en-US" dirty="0" smtClean="0"/>
+              <a:rPr lang="en-US" dirty="0"/>
               <a:t> </a:t>
             </a:r>
             <a:r>
-              <a:rPr lang="en-US" dirty="0" err="1" smtClean="0"/>
+              <a:rPr lang="en-US" dirty="0" err="1"/>
               <a:t>proiectului</a:t>
             </a:r>
             <a:endParaRPr lang="ro-RO" dirty="0"/>
@@ -7637,13 +8023,8 @@
           <a:p>
             <a:r>
               <a:rPr lang="ro-RO" sz="3200" b="1" dirty="0"/>
-              <a:t>Săptămânile </a:t>
-            </a:r>
-            <a:r>
-              <a:rPr lang="ro-RO" sz="3200" b="1" dirty="0" smtClean="0"/>
-              <a:t>1-3</a:t>
-            </a:r>
-            <a:endParaRPr lang="ro-RO" sz="3200" b="1" dirty="0"/>
+              <a:t>Săptămânile 1-3</a:t>
+            </a:r>
           </a:p>
         </p:txBody>
       </p:sp>
@@ -7657,13 +8038,6 @@
   <p:clrMapOvr>
     <a:masterClrMapping/>
   </p:clrMapOvr>
-  <p:timing>
-    <p:tnLst>
-      <p:par>
-        <p:cTn id="1" dur="indefinite" restart="never" nodeType="tmRoot"/>
-      </p:par>
-    </p:tnLst>
-  </p:timing>
 </p:sld>
 </file>
 
@@ -7700,19 +8074,19 @@
           <a:lstStyle/>
           <a:p>
             <a:r>
-              <a:rPr lang="en-US" dirty="0" err="1" smtClean="0"/>
+              <a:rPr lang="en-US" dirty="0" err="1"/>
               <a:t>Etapele</a:t>
             </a:r>
             <a:r>
-              <a:rPr lang="en-US" dirty="0" smtClean="0"/>
+              <a:rPr lang="en-US" dirty="0"/>
               <a:t> implement</a:t>
             </a:r>
             <a:r>
-              <a:rPr lang="ro-RO" dirty="0" smtClean="0"/>
+              <a:rPr lang="ro-RO" dirty="0"/>
               <a:t>ă</a:t>
             </a:r>
             <a:r>
-              <a:rPr lang="en-US" dirty="0" err="1" smtClean="0"/>
+              <a:rPr lang="en-US" dirty="0" err="1"/>
               <a:t>rii</a:t>
             </a:r>
             <a:endParaRPr lang="ro-RO" dirty="0"/>
@@ -7740,88 +8114,96 @@
           <a:lstStyle/>
           <a:p>
             <a:r>
-              <a:rPr lang="en-US" dirty="0" err="1" smtClean="0"/>
+              <a:rPr lang="en-US" dirty="0" err="1"/>
               <a:t>Documentare</a:t>
             </a:r>
             <a:r>
-              <a:rPr lang="en-US" dirty="0" smtClean="0"/>
+              <a:rPr lang="en-US" dirty="0"/>
               <a:t> </a:t>
             </a:r>
             <a:r>
-              <a:rPr lang="en-US" dirty="0" err="1" smtClean="0"/>
+              <a:rPr lang="en-US" dirty="0" err="1"/>
               <a:t>pe</a:t>
             </a:r>
             <a:r>
-              <a:rPr lang="en-US" dirty="0" smtClean="0"/>
+              <a:rPr lang="en-US" dirty="0"/>
               <a:t> </a:t>
             </a:r>
             <a:r>
-              <a:rPr lang="en-US" dirty="0" err="1" smtClean="0"/>
+              <a:rPr lang="en-US" dirty="0" err="1"/>
               <a:t>tema</a:t>
             </a:r>
             <a:r>
-              <a:rPr lang="en-US" dirty="0" smtClean="0"/>
+              <a:rPr lang="en-US" dirty="0"/>
               <a:t> </a:t>
             </a:r>
             <a:r>
-              <a:rPr lang="en-US" dirty="0" err="1" smtClean="0"/>
-              <a:t>propusa</a:t>
-            </a:r>
-            <a:endParaRPr lang="en-US" dirty="0" smtClean="0"/>
-          </a:p>
-          <a:p>
-            <a:r>
-              <a:rPr lang="en-US" dirty="0" err="1" smtClean="0"/>
+              <a:rPr lang="en-US" dirty="0" err="1"/>
+              <a:t>propus</a:t>
+            </a:r>
+            <a:r>
+              <a:rPr lang="ro-RO" dirty="0"/>
+              <a:t>ă</a:t>
+            </a:r>
+            <a:endParaRPr lang="en-US" dirty="0"/>
+          </a:p>
+          <a:p>
+            <a:r>
+              <a:rPr lang="en-US" dirty="0" err="1"/>
               <a:t>Identificarea</a:t>
             </a:r>
             <a:r>
-              <a:rPr lang="en-US" dirty="0" smtClean="0"/>
+              <a:rPr lang="en-US" dirty="0"/>
               <a:t> </a:t>
             </a:r>
             <a:r>
-              <a:rPr lang="en-US" dirty="0" err="1" smtClean="0"/>
+              <a:rPr lang="en-US" dirty="0" err="1"/>
               <a:t>regulilor</a:t>
             </a:r>
             <a:r>
-              <a:rPr lang="en-US" dirty="0" smtClean="0"/>
+              <a:rPr lang="en-US" dirty="0"/>
               <a:t> de </a:t>
             </a:r>
             <a:r>
-              <a:rPr lang="en-US" dirty="0" err="1" smtClean="0"/>
+              <a:rPr lang="en-US" dirty="0" err="1"/>
               <a:t>joc</a:t>
             </a:r>
-            <a:endParaRPr lang="en-US" dirty="0" smtClean="0"/>
-          </a:p>
-          <a:p>
-            <a:r>
-              <a:rPr lang="en-US" dirty="0" err="1" smtClean="0"/>
+            <a:endParaRPr lang="en-US" dirty="0"/>
+          </a:p>
+          <a:p>
+            <a:r>
+              <a:rPr lang="en-US" dirty="0" err="1"/>
               <a:t>Realizarea</a:t>
             </a:r>
             <a:r>
-              <a:rPr lang="en-US" dirty="0" smtClean="0"/>
+              <a:rPr lang="en-US" dirty="0"/>
               <a:t> de </a:t>
             </a:r>
             <a:r>
-              <a:rPr lang="en-US" dirty="0" err="1" smtClean="0"/>
+              <a:rPr lang="en-US" dirty="0" err="1"/>
               <a:t>proiect</a:t>
             </a:r>
             <a:r>
-              <a:rPr lang="en-US" dirty="0" smtClean="0"/>
+              <a:rPr lang="en-US" dirty="0"/>
               <a:t> – pilot</a:t>
             </a:r>
           </a:p>
           <a:p>
             <a:r>
-              <a:rPr lang="en-US" dirty="0" err="1" smtClean="0"/>
+              <a:rPr lang="en-US" dirty="0" err="1"/>
               <a:t>Crearea</a:t>
             </a:r>
             <a:r>
-              <a:rPr lang="en-US" dirty="0" smtClean="0"/>
-              <a:t> de repository in </a:t>
-            </a:r>
-            <a:r>
-              <a:rPr lang="en-US" dirty="0" err="1" smtClean="0"/>
-              <a:t>GitHub</a:t>
+              <a:rPr lang="en-US" dirty="0"/>
+              <a:t> de repository </a:t>
+            </a:r>
+            <a:r>
+              <a:rPr lang="ro-RO" dirty="0"/>
+              <a:t>î</a:t>
+            </a:r>
+            <a:r>
+              <a:rPr lang="en-US" dirty="0"/>
+              <a:t>n GitHub</a:t>
             </a:r>
             <a:endParaRPr lang="ro-RO" dirty="0"/>
           </a:p>
@@ -7870,7 +8252,7 @@
               <a:t>Săptămânile </a:t>
             </a:r>
             <a:r>
-              <a:rPr lang="en-US" sz="3200" b="1" dirty="0" smtClean="0"/>
+              <a:rPr lang="en-US" sz="3200" b="1" dirty="0"/>
               <a:t>4-7</a:t>
             </a:r>
             <a:endParaRPr lang="ro-RO" sz="3200" b="1" dirty="0"/>
@@ -7887,13 +8269,6 @@
   <p:clrMapOvr>
     <a:masterClrMapping/>
   </p:clrMapOvr>
-  <p:timing>
-    <p:tnLst>
-      <p:par>
-        <p:cTn id="1" dur="indefinite" restart="never" nodeType="tmRoot"/>
-      </p:par>
-    </p:tnLst>
-  </p:timing>
 </p:sld>
 </file>
 
@@ -7930,19 +8305,19 @@
           <a:lstStyle/>
           <a:p>
             <a:r>
-              <a:rPr lang="en-US" dirty="0" err="1" smtClean="0"/>
+              <a:rPr lang="en-US" dirty="0" err="1"/>
               <a:t>Etapele</a:t>
             </a:r>
             <a:r>
-              <a:rPr lang="en-US" dirty="0" smtClean="0"/>
+              <a:rPr lang="en-US" dirty="0"/>
               <a:t> implement</a:t>
             </a:r>
             <a:r>
-              <a:rPr lang="ro-RO" dirty="0" smtClean="0"/>
+              <a:rPr lang="ro-RO" dirty="0"/>
               <a:t>ă</a:t>
             </a:r>
             <a:r>
-              <a:rPr lang="en-US" dirty="0" err="1" smtClean="0"/>
+              <a:rPr lang="en-US" dirty="0" err="1"/>
               <a:t>rii</a:t>
             </a:r>
             <a:endParaRPr lang="ro-RO" dirty="0"/>
@@ -7961,8 +8336,8 @@
         </p:nvSpPr>
         <p:spPr>
           <a:xfrm>
-            <a:off x="1524000" y="2286000"/>
-            <a:ext cx="7162800" cy="3916363"/>
+            <a:off x="1523999" y="2286000"/>
+            <a:ext cx="7335253" cy="3916363"/>
           </a:xfrm>
         </p:spPr>
         <p:txBody>
@@ -7972,160 +8347,193 @@
           <a:lstStyle/>
           <a:p>
             <a:r>
-              <a:rPr lang="en-US" dirty="0" err="1" smtClean="0"/>
+              <a:rPr lang="en-US" dirty="0" err="1"/>
               <a:t>Realizarea</a:t>
             </a:r>
             <a:r>
-              <a:rPr lang="en-US" dirty="0" smtClean="0"/>
+              <a:rPr lang="en-US" dirty="0"/>
               <a:t> </a:t>
             </a:r>
             <a:r>
-              <a:rPr lang="en-US" dirty="0" err="1" smtClean="0"/>
+              <a:rPr lang="en-US" dirty="0" err="1"/>
               <a:t>mediului</a:t>
             </a:r>
             <a:r>
-              <a:rPr lang="en-US" dirty="0" smtClean="0"/>
+              <a:rPr lang="en-US" dirty="0"/>
               <a:t> de </a:t>
             </a:r>
             <a:r>
-              <a:rPr lang="en-US" dirty="0" err="1" smtClean="0"/>
+              <a:rPr lang="en-US" dirty="0" err="1"/>
               <a:t>joc</a:t>
             </a:r>
             <a:r>
-              <a:rPr lang="en-US" dirty="0" smtClean="0"/>
+              <a:rPr lang="en-US" dirty="0"/>
               <a:t> (</a:t>
             </a:r>
             <a:r>
-              <a:rPr lang="en-US" dirty="0" err="1" smtClean="0"/>
+              <a:rPr lang="en-US" dirty="0" err="1"/>
               <a:t>amplasarea</a:t>
             </a:r>
             <a:r>
-              <a:rPr lang="en-US" dirty="0" smtClean="0"/>
+              <a:rPr lang="en-US" dirty="0"/>
               <a:t> </a:t>
             </a:r>
             <a:r>
-              <a:rPr lang="en-US" dirty="0" err="1" smtClean="0"/>
+              <a:rPr lang="en-US" dirty="0" err="1"/>
               <a:t>tablei</a:t>
             </a:r>
             <a:r>
-              <a:rPr lang="en-US" dirty="0" smtClean="0"/>
+              <a:rPr lang="en-US" dirty="0"/>
               <a:t> </a:t>
             </a:r>
             <a:r>
-              <a:rPr lang="en-US" dirty="0" err="1" smtClean="0"/>
-              <a:t>si</a:t>
-            </a:r>
-            <a:r>
-              <a:rPr lang="en-US" dirty="0" smtClean="0"/>
+              <a:rPr lang="ro-RO" dirty="0" err="1"/>
+              <a:t>ș</a:t>
+            </a:r>
+            <a:r>
+              <a:rPr lang="en-US" dirty="0" err="1"/>
+              <a:t>i</a:t>
+            </a:r>
+            <a:r>
+              <a:rPr lang="en-US" dirty="0"/>
               <a:t> a </a:t>
             </a:r>
             <a:r>
-              <a:rPr lang="en-US" dirty="0" err="1" smtClean="0"/>
+              <a:rPr lang="en-US" dirty="0" err="1"/>
               <a:t>pieselor</a:t>
             </a:r>
             <a:r>
-              <a:rPr lang="en-US" dirty="0" smtClean="0"/>
+              <a:rPr lang="en-US" dirty="0"/>
               <a:t>)</a:t>
             </a:r>
           </a:p>
           <a:p>
             <a:r>
-              <a:rPr lang="en-US" dirty="0" err="1" smtClean="0"/>
+              <a:rPr lang="en-US" dirty="0" err="1"/>
               <a:t>Generarea</a:t>
             </a:r>
             <a:r>
-              <a:rPr lang="en-US" dirty="0" smtClean="0"/>
+              <a:rPr lang="en-US" dirty="0"/>
               <a:t> </a:t>
             </a:r>
             <a:r>
-              <a:rPr lang="en-US" dirty="0" err="1" smtClean="0"/>
-              <a:t>initiala</a:t>
-            </a:r>
-            <a:r>
-              <a:rPr lang="en-US" dirty="0" smtClean="0"/>
+              <a:rPr lang="en-US" dirty="0" err="1"/>
+              <a:t>ini</a:t>
+            </a:r>
+            <a:r>
+              <a:rPr lang="ro-RO" dirty="0"/>
+              <a:t>ț</a:t>
+            </a:r>
+            <a:r>
+              <a:rPr lang="en-US" dirty="0" err="1"/>
+              <a:t>ial</a:t>
+            </a:r>
+            <a:r>
+              <a:rPr lang="ro-RO" dirty="0"/>
+              <a:t>ă</a:t>
+            </a:r>
+            <a:r>
+              <a:rPr lang="en-US" dirty="0"/>
               <a:t> a </a:t>
             </a:r>
             <a:r>
-              <a:rPr lang="en-US" dirty="0" err="1" smtClean="0"/>
+              <a:rPr lang="en-US" dirty="0" err="1"/>
               <a:t>pieselor</a:t>
             </a:r>
-            <a:endParaRPr lang="en-US" dirty="0" smtClean="0"/>
-          </a:p>
-          <a:p>
-            <a:r>
-              <a:rPr lang="en-US" dirty="0" err="1" smtClean="0"/>
+            <a:endParaRPr lang="en-US" dirty="0"/>
+          </a:p>
+          <a:p>
+            <a:r>
+              <a:rPr lang="en-US" dirty="0" err="1"/>
               <a:t>Implementarea</a:t>
             </a:r>
             <a:r>
-              <a:rPr lang="en-US" dirty="0" smtClean="0"/>
+              <a:rPr lang="en-US" dirty="0"/>
               <a:t> de </a:t>
             </a:r>
             <a:r>
-              <a:rPr lang="en-US" dirty="0" err="1" smtClean="0"/>
-              <a:t>mutari</a:t>
-            </a:r>
-            <a:r>
-              <a:rPr lang="en-US" dirty="0" smtClean="0"/>
+              <a:rPr lang="en-US" dirty="0" err="1"/>
+              <a:t>mut</a:t>
+            </a:r>
+            <a:r>
+              <a:rPr lang="ro-RO" dirty="0"/>
+              <a:t>ă</a:t>
+            </a:r>
+            <a:r>
+              <a:rPr lang="en-US" dirty="0" err="1"/>
+              <a:t>ri</a:t>
+            </a:r>
+            <a:r>
+              <a:rPr lang="en-US" dirty="0"/>
               <a:t> </a:t>
             </a:r>
             <a:r>
-              <a:rPr lang="en-US" dirty="0" err="1" smtClean="0"/>
+              <a:rPr lang="en-US" dirty="0" err="1"/>
               <a:t>folosind</a:t>
             </a:r>
             <a:r>
-              <a:rPr lang="en-US" dirty="0" smtClean="0"/>
+              <a:rPr lang="en-US" dirty="0"/>
               <a:t> mouse</a:t>
             </a:r>
-          </a:p>
-          <a:p>
-            <a:r>
-              <a:rPr lang="en-US" dirty="0" err="1" smtClean="0"/>
+            <a:r>
+              <a:rPr lang="ro-RO" dirty="0"/>
+              <a:t>-ul</a:t>
+            </a:r>
+            <a:endParaRPr lang="en-US" dirty="0"/>
+          </a:p>
+          <a:p>
+            <a:r>
+              <a:rPr lang="en-US" dirty="0" err="1"/>
               <a:t>Codarea</a:t>
             </a:r>
             <a:r>
-              <a:rPr lang="en-US" dirty="0" smtClean="0"/>
+              <a:rPr lang="en-US" dirty="0"/>
               <a:t> </a:t>
             </a:r>
             <a:r>
-              <a:rPr lang="en-US" dirty="0" err="1" smtClean="0"/>
+              <a:rPr lang="en-US" dirty="0" err="1"/>
               <a:t>regulilor</a:t>
             </a:r>
             <a:r>
-              <a:rPr lang="en-US" dirty="0" smtClean="0"/>
+              <a:rPr lang="en-US" dirty="0"/>
               <a:t> de </a:t>
             </a:r>
             <a:r>
-              <a:rPr lang="en-US" dirty="0" err="1" smtClean="0"/>
+              <a:rPr lang="en-US" dirty="0" err="1"/>
               <a:t>joc</a:t>
             </a:r>
             <a:r>
-              <a:rPr lang="en-US" dirty="0" smtClean="0"/>
+              <a:rPr lang="en-US" dirty="0"/>
               <a:t> </a:t>
             </a:r>
           </a:p>
           <a:p>
             <a:r>
-              <a:rPr lang="en-US" dirty="0" err="1" smtClean="0"/>
+              <a:rPr lang="en-US" dirty="0" err="1"/>
               <a:t>Importarea</a:t>
             </a:r>
             <a:r>
-              <a:rPr lang="en-US" dirty="0" smtClean="0"/>
+              <a:rPr lang="en-US" dirty="0"/>
               <a:t> </a:t>
             </a:r>
             <a:r>
-              <a:rPr lang="en-US" dirty="0" err="1" smtClean="0"/>
+              <a:rPr lang="en-US" dirty="0" err="1"/>
               <a:t>modulelor</a:t>
             </a:r>
             <a:r>
-              <a:rPr lang="en-US" dirty="0" smtClean="0"/>
+              <a:rPr lang="en-US" dirty="0"/>
               <a:t> software Leap Motion </a:t>
             </a:r>
             <a:r>
-              <a:rPr lang="en-US" dirty="0" err="1" smtClean="0"/>
-              <a:t>si</a:t>
-            </a:r>
-            <a:r>
-              <a:rPr lang="en-US" dirty="0" smtClean="0"/>
+              <a:rPr lang="ro-RO" dirty="0" err="1"/>
+              <a:t>ș</a:t>
+            </a:r>
+            <a:r>
+              <a:rPr lang="en-US" dirty="0" err="1"/>
+              <a:t>i</a:t>
+            </a:r>
+            <a:r>
+              <a:rPr lang="en-US" dirty="0"/>
               <a:t> Interaction Engine</a:t>
             </a:r>
             <a:endParaRPr lang="ro-RO" dirty="0"/>
@@ -8175,7 +8583,7 @@
               <a:t>Săptămânile </a:t>
             </a:r>
             <a:r>
-              <a:rPr lang="en-US" sz="3200" b="1" dirty="0" smtClean="0"/>
+              <a:rPr lang="en-US" sz="3200" b="1" dirty="0"/>
               <a:t>8-12</a:t>
             </a:r>
             <a:endParaRPr lang="ro-RO" sz="3200" b="1" dirty="0"/>
@@ -8192,13 +8600,6 @@
   <p:clrMapOvr>
     <a:masterClrMapping/>
   </p:clrMapOvr>
-  <p:timing>
-    <p:tnLst>
-      <p:par>
-        <p:cTn id="1" dur="indefinite" restart="never" nodeType="tmRoot"/>
-      </p:par>
-    </p:tnLst>
-  </p:timing>
 </p:sld>
 </file>
 

</xml_diff>